<commit_message>
Presentation compelt about react
</commit_message>
<xml_diff>
--- a/NFT-Shop.pptx
+++ b/NFT-Shop.pptx
@@ -5,27 +5,29 @@
     <p:sldMasterId id="2147483672" r:id="rId1"/>
   </p:sldMasterIdLst>
   <p:notesMasterIdLst>
-    <p:notesMasterId r:id="rId17"/>
+    <p:notesMasterId r:id="rId19"/>
   </p:notesMasterIdLst>
   <p:handoutMasterIdLst>
-    <p:handoutMasterId r:id="rId18"/>
+    <p:handoutMasterId r:id="rId20"/>
   </p:handoutMasterIdLst>
   <p:sldIdLst>
     <p:sldId id="256" r:id="rId2"/>
     <p:sldId id="261" r:id="rId3"/>
-    <p:sldId id="262" r:id="rId4"/>
-    <p:sldId id="269" r:id="rId5"/>
-    <p:sldId id="270" r:id="rId6"/>
-    <p:sldId id="271" r:id="rId7"/>
-    <p:sldId id="273" r:id="rId8"/>
-    <p:sldId id="272" r:id="rId9"/>
-    <p:sldId id="268" r:id="rId10"/>
-    <p:sldId id="263" r:id="rId11"/>
-    <p:sldId id="264" r:id="rId12"/>
-    <p:sldId id="265" r:id="rId13"/>
-    <p:sldId id="266" r:id="rId14"/>
-    <p:sldId id="267" r:id="rId15"/>
-    <p:sldId id="260" r:id="rId16"/>
+    <p:sldId id="266" r:id="rId4"/>
+    <p:sldId id="262" r:id="rId5"/>
+    <p:sldId id="269" r:id="rId6"/>
+    <p:sldId id="276" r:id="rId7"/>
+    <p:sldId id="271" r:id="rId8"/>
+    <p:sldId id="273" r:id="rId9"/>
+    <p:sldId id="272" r:id="rId10"/>
+    <p:sldId id="275" r:id="rId11"/>
+    <p:sldId id="274" r:id="rId12"/>
+    <p:sldId id="268" r:id="rId13"/>
+    <p:sldId id="263" r:id="rId14"/>
+    <p:sldId id="264" r:id="rId15"/>
+    <p:sldId id="265" r:id="rId16"/>
+    <p:sldId id="267" r:id="rId17"/>
+    <p:sldId id="260" r:id="rId18"/>
   </p:sldIdLst>
   <p:sldSz cx="12192000" cy="6858000"/>
   <p:notesSz cx="6858000" cy="9144000"/>
@@ -125,6 +127,31 @@
     </a:lvl9pPr>
   </p:defaultTextStyle>
   <p:extLst>
+    <p:ext uri="{521415D9-36F7-43E2-AB2F-B90AF26B5E84}">
+      <p14:sectionLst xmlns:p14="http://schemas.microsoft.com/office/powerpoint/2010/main">
+        <p14:section name="Untitled Section" id="{0398F41A-246E-4CFD-967A-587EDD56EE87}">
+          <p14:sldIdLst>
+            <p14:sldId id="256"/>
+            <p14:sldId id="261"/>
+            <p14:sldId id="266"/>
+            <p14:sldId id="262"/>
+            <p14:sldId id="269"/>
+            <p14:sldId id="276"/>
+            <p14:sldId id="271"/>
+            <p14:sldId id="273"/>
+            <p14:sldId id="272"/>
+            <p14:sldId id="275"/>
+            <p14:sldId id="274"/>
+            <p14:sldId id="268"/>
+            <p14:sldId id="263"/>
+            <p14:sldId id="264"/>
+            <p14:sldId id="265"/>
+            <p14:sldId id="267"/>
+            <p14:sldId id="260"/>
+          </p14:sldIdLst>
+        </p14:section>
+      </p14:sectionLst>
+    </p:ext>
     <p:ext uri="{EFAFB233-063F-42B5-8137-9DF3F51BA10A}">
       <p15:sldGuideLst xmlns:p15="http://schemas.microsoft.com/office/powerpoint/2012/main"/>
     </p:ext>
@@ -822,7 +849,7 @@
           <a:p>
             <a:fld id="{C6B3AB32-59DF-41F1-9618-EDFBF5049629}" type="slidenum">
               <a:rPr lang="en-US" smtClean="0"/>
-              <a:t>15</a:t>
+              <a:t>17</a:t>
             </a:fld>
             <a:endParaRPr lang="en-US" dirty="0"/>
           </a:p>
@@ -5135,7 +5162,7 @@
           <p:cNvPr id="2" name="Title 1">
             <a:extLst>
               <a:ext uri="{FF2B5EF4-FFF2-40B4-BE49-F238E27FC236}">
-                <a16:creationId xmlns:a16="http://schemas.microsoft.com/office/drawing/2014/main" id="{4600B480-AA42-45C5-BCB4-0D06C625B169}"/>
+                <a16:creationId xmlns:a16="http://schemas.microsoft.com/office/drawing/2014/main" id="{5DCC1416-FFE1-4480-8395-38480F8F7D2D}"/>
               </a:ext>
             </a:extLst>
           </p:cNvPr>
@@ -5146,25 +5173,32 @@
             <p:ph type="title"/>
           </p:nvPr>
         </p:nvSpPr>
-        <p:spPr/>
-        <p:txBody>
-          <a:bodyPr/>
+        <p:spPr>
+          <a:xfrm>
+            <a:off x="581193" y="729658"/>
+            <a:ext cx="11029616" cy="988332"/>
+          </a:xfrm>
+        </p:spPr>
+        <p:txBody>
+          <a:bodyPr anchor="b">
+            <a:normAutofit/>
+          </a:bodyPr>
           <a:lstStyle/>
           <a:p>
             <a:r>
-              <a:rPr lang="de-DE" dirty="0" err="1"/>
-              <a:t>TypeScript</a:t>
-            </a:r>
-            <a:endParaRPr lang="en-US" dirty="0"/>
-          </a:p>
-        </p:txBody>
-      </p:sp>
-      <p:sp>
-        <p:nvSpPr>
-          <p:cNvPr id="3" name="Content Placeholder 2">
+              <a:rPr lang="de-DE" dirty="0"/>
+              <a:t>Recoil</a:t>
+            </a:r>
+            <a:endParaRPr lang="en-US" dirty="0"/>
+          </a:p>
+        </p:txBody>
+      </p:sp>
+      <p:sp>
+        <p:nvSpPr>
+          <p:cNvPr id="9" name="Content Placeholder 2">
             <a:extLst>
               <a:ext uri="{FF2B5EF4-FFF2-40B4-BE49-F238E27FC236}">
-                <a16:creationId xmlns:a16="http://schemas.microsoft.com/office/drawing/2014/main" id="{9E6CA42C-39BF-4909-AD56-CD335BF350E5}"/>
+                <a16:creationId xmlns:a16="http://schemas.microsoft.com/office/drawing/2014/main" id="{8B3B496F-DD1A-457C-AA49-DD47134B29A4}"/>
               </a:ext>
             </a:extLst>
           </p:cNvPr>
@@ -5172,73 +5206,100 @@
             <a:spLocks noGrp="1"/>
           </p:cNvSpPr>
           <p:nvPr>
-            <p:ph idx="1"/>
-          </p:nvPr>
-        </p:nvSpPr>
-        <p:spPr/>
-        <p:txBody>
-          <a:bodyPr/>
+            <p:ph sz="half" idx="1"/>
+          </p:nvPr>
+        </p:nvSpPr>
+        <p:spPr>
+          <a:xfrm>
+            <a:off x="581193" y="2228003"/>
+            <a:ext cx="5422390" cy="3633047"/>
+          </a:xfrm>
+        </p:spPr>
+        <p:txBody>
+          <a:bodyPr anchor="ctr">
+            <a:normAutofit/>
+          </a:bodyPr>
           <a:lstStyle/>
           <a:p>
             <a:r>
               <a:rPr lang="de-DE" dirty="0"/>
-              <a:t>Entwickler: Microsoft</a:t>
-            </a:r>
+              <a:t>Globales State </a:t>
+            </a:r>
+            <a:r>
+              <a:rPr lang="de-DE" dirty="0" err="1"/>
+              <a:t>Managment</a:t>
+            </a:r>
+            <a:endParaRPr lang="de-DE" dirty="0"/>
           </a:p>
           <a:p>
             <a:r>
               <a:rPr lang="de-DE" dirty="0"/>
-              <a:t>Erscheinungsjahr: 2012</a:t>
+              <a:t>Verwaltet States von mehreren Komponenten in Echtzeit</a:t>
             </a:r>
           </a:p>
           <a:p>
             <a:r>
               <a:rPr lang="de-DE" dirty="0"/>
-              <a:t>Vorteile:</a:t>
-            </a:r>
-          </a:p>
-          <a:p>
-            <a:pPr lvl="1"/>
-            <a:r>
-              <a:rPr lang="de-DE" dirty="0"/>
-              <a:t>Einfachere </a:t>
-            </a:r>
-            <a:r>
-              <a:rPr lang="de-DE" dirty="0" err="1"/>
-              <a:t>arbeit</a:t>
-            </a:r>
-            <a:r>
-              <a:rPr lang="de-DE" dirty="0"/>
-              <a:t> mit Datentypen</a:t>
-            </a:r>
-          </a:p>
-          <a:p>
-            <a:pPr lvl="1"/>
-            <a:r>
-              <a:rPr lang="de-DE" dirty="0"/>
-              <a:t>Weniger </a:t>
-            </a:r>
-            <a:r>
-              <a:rPr lang="de-DE" dirty="0" err="1"/>
-              <a:t>RunTime</a:t>
-            </a:r>
-            <a:r>
-              <a:rPr lang="de-DE" dirty="0"/>
-              <a:t> Errors</a:t>
-            </a:r>
-          </a:p>
-          <a:p>
-            <a:endParaRPr lang="de-DE" dirty="0"/>
-          </a:p>
-          <a:p>
-            <a:endParaRPr lang="en-US" dirty="0"/>
-          </a:p>
-        </p:txBody>
-      </p:sp>
+              <a:t>Updated nur nötige Komponenten</a:t>
+            </a:r>
+          </a:p>
+          <a:p>
+            <a:endParaRPr lang="en-US" dirty="0"/>
+          </a:p>
+        </p:txBody>
+      </p:sp>
+      <p:pic>
+        <p:nvPicPr>
+          <p:cNvPr id="4098" name="Picture 2" descr="Text&#10;&#10;Description automatically generated">
+            <a:extLst>
+              <a:ext uri="{FF2B5EF4-FFF2-40B4-BE49-F238E27FC236}">
+                <a16:creationId xmlns:a16="http://schemas.microsoft.com/office/drawing/2014/main" id="{F67DED3B-0BF8-48B0-8E74-8D6A619EC1FA}"/>
+              </a:ext>
+            </a:extLst>
+          </p:cNvPr>
+          <p:cNvPicPr>
+            <a:picLocks noChangeAspect="1" noChangeArrowheads="1"/>
+          </p:cNvPicPr>
+          <p:nvPr/>
+        </p:nvPicPr>
+        <p:blipFill>
+          <a:blip r:embed="rId2">
+            <a:extLst>
+              <a:ext uri="{28A0092B-C50C-407E-A947-70E740481C1C}">
+                <a14:useLocalDpi xmlns:a14="http://schemas.microsoft.com/office/drawing/2010/main" val="0"/>
+              </a:ext>
+            </a:extLst>
+          </a:blip>
+          <a:stretch>
+            <a:fillRect/>
+          </a:stretch>
+        </p:blipFill>
+        <p:spPr bwMode="auto">
+          <a:xfrm>
+            <a:off x="6188417" y="2349235"/>
+            <a:ext cx="5422392" cy="3390582"/>
+          </a:xfrm>
+          <a:prstGeom prst="rect">
+            <a:avLst/>
+          </a:prstGeom>
+          <a:solidFill>
+            <a:srgbClr val="FFFFFF"/>
+          </a:solidFill>
+          <a:extLst>
+            <a:ext uri="{909E8E84-426E-40DD-AFC4-6F175D3DCCD1}">
+              <a14:hiddenFill xmlns:a14="http://schemas.microsoft.com/office/drawing/2010/main">
+                <a:solidFill>
+                  <a:srgbClr val="FFFFFF"/>
+                </a:solidFill>
+              </a14:hiddenFill>
+            </a:ext>
+          </a:extLst>
+        </p:spPr>
+      </p:pic>
     </p:spTree>
     <p:extLst>
       <p:ext uri="{BB962C8B-B14F-4D97-AF65-F5344CB8AC3E}">
-        <p14:creationId xmlns:p14="http://schemas.microsoft.com/office/powerpoint/2010/main" val="2188900832"/>
+        <p14:creationId xmlns:p14="http://schemas.microsoft.com/office/powerpoint/2010/main" val="3464138196"/>
       </p:ext>
     </p:extLst>
   </p:cSld>
@@ -5270,7 +5331,7 @@
           <p:cNvPr id="2" name="Title 1">
             <a:extLst>
               <a:ext uri="{FF2B5EF4-FFF2-40B4-BE49-F238E27FC236}">
-                <a16:creationId xmlns:a16="http://schemas.microsoft.com/office/drawing/2014/main" id="{D12AEE22-D569-4E5C-99F8-63D5DB21A456}"/>
+                <a16:creationId xmlns:a16="http://schemas.microsoft.com/office/drawing/2014/main" id="{D2DA2998-A3E8-473A-A1A0-14E23A6C3159}"/>
               </a:ext>
             </a:extLst>
           </p:cNvPr>
@@ -5281,25 +5342,32 @@
             <p:ph type="title"/>
           </p:nvPr>
         </p:nvSpPr>
-        <p:spPr/>
-        <p:txBody>
-          <a:bodyPr/>
+        <p:spPr>
+          <a:xfrm>
+            <a:off x="581193" y="729658"/>
+            <a:ext cx="11029616" cy="988332"/>
+          </a:xfrm>
+        </p:spPr>
+        <p:txBody>
+          <a:bodyPr anchor="b">
+            <a:normAutofit/>
+          </a:bodyPr>
           <a:lstStyle/>
           <a:p>
             <a:r>
               <a:rPr lang="de-DE" dirty="0"/>
-              <a:t>Material UI</a:t>
-            </a:r>
-            <a:endParaRPr lang="en-US" dirty="0"/>
-          </a:p>
-        </p:txBody>
-      </p:sp>
-      <p:sp>
-        <p:nvSpPr>
-          <p:cNvPr id="3" name="Content Placeholder 2">
+              <a:t>Routing</a:t>
+            </a:r>
+            <a:endParaRPr lang="en-US" dirty="0"/>
+          </a:p>
+        </p:txBody>
+      </p:sp>
+      <p:sp>
+        <p:nvSpPr>
+          <p:cNvPr id="73" name="Content Placeholder 2">
             <a:extLst>
               <a:ext uri="{FF2B5EF4-FFF2-40B4-BE49-F238E27FC236}">
-                <a16:creationId xmlns:a16="http://schemas.microsoft.com/office/drawing/2014/main" id="{3BDE542D-5B6D-49F6-8946-D595602E9432}"/>
+                <a16:creationId xmlns:a16="http://schemas.microsoft.com/office/drawing/2014/main" id="{F48C31D2-7C26-4B16-92C9-69CB96E04B14}"/>
               </a:ext>
             </a:extLst>
           </p:cNvPr>
@@ -5307,40 +5375,91 @@
             <a:spLocks noGrp="1"/>
           </p:cNvSpPr>
           <p:nvPr>
-            <p:ph idx="1"/>
-          </p:nvPr>
-        </p:nvSpPr>
-        <p:spPr/>
+            <p:ph sz="half" idx="1"/>
+          </p:nvPr>
+        </p:nvSpPr>
+        <p:spPr>
+          <a:xfrm>
+            <a:off x="581193" y="2228003"/>
+            <a:ext cx="5422390" cy="3633047"/>
+          </a:xfrm>
+        </p:spPr>
         <p:txBody>
           <a:bodyPr/>
           <a:lstStyle/>
           <a:p>
             <a:r>
               <a:rPr lang="de-DE" dirty="0"/>
-              <a:t>UI Framework</a:t>
+              <a:t>Eigenes Package</a:t>
             </a:r>
           </a:p>
           <a:p>
             <a:r>
               <a:rPr lang="de-DE" dirty="0"/>
-              <a:t>Komponente sind nicht angewiesen auf andere Erweiterungen</a:t>
+              <a:t>„Mehr Seitige Anwendungen“ möglich</a:t>
             </a:r>
           </a:p>
           <a:p>
             <a:r>
               <a:rPr lang="de-DE" dirty="0"/>
-              <a:t>Gut ausgearbeitet Dokumentation sowie Beispiele</a:t>
-            </a:r>
-          </a:p>
-          <a:p>
-            <a:endParaRPr lang="en-US" dirty="0"/>
-          </a:p>
-        </p:txBody>
-      </p:sp>
+              <a:t>Fängt abfrage ab und liefert den passenden Komponenten aus</a:t>
+            </a:r>
+            <a:endParaRPr lang="en-US" dirty="0"/>
+          </a:p>
+        </p:txBody>
+      </p:sp>
+      <p:pic>
+        <p:nvPicPr>
+          <p:cNvPr id="2052" name="Picture 4">
+            <a:extLst>
+              <a:ext uri="{FF2B5EF4-FFF2-40B4-BE49-F238E27FC236}">
+                <a16:creationId xmlns:a16="http://schemas.microsoft.com/office/drawing/2014/main" id="{01B92037-8522-4EDC-B279-0449A4827611}"/>
+              </a:ext>
+            </a:extLst>
+          </p:cNvPr>
+          <p:cNvPicPr>
+            <a:picLocks noChangeAspect="1" noChangeArrowheads="1"/>
+          </p:cNvPicPr>
+          <p:nvPr/>
+        </p:nvPicPr>
+        <p:blipFill>
+          <a:blip r:embed="rId2">
+            <a:extLst>
+              <a:ext uri="{28A0092B-C50C-407E-A947-70E740481C1C}">
+                <a14:useLocalDpi xmlns:a14="http://schemas.microsoft.com/office/drawing/2010/main" val="0"/>
+              </a:ext>
+            </a:extLst>
+          </a:blip>
+          <a:stretch>
+            <a:fillRect/>
+          </a:stretch>
+        </p:blipFill>
+        <p:spPr bwMode="auto">
+          <a:xfrm>
+            <a:off x="6188417" y="2973604"/>
+            <a:ext cx="5422392" cy="2141844"/>
+          </a:xfrm>
+          <a:prstGeom prst="rect">
+            <a:avLst/>
+          </a:prstGeom>
+          <a:solidFill>
+            <a:srgbClr val="FFFFFF"/>
+          </a:solidFill>
+          <a:extLst>
+            <a:ext uri="{909E8E84-426E-40DD-AFC4-6F175D3DCCD1}">
+              <a14:hiddenFill xmlns:a14="http://schemas.microsoft.com/office/drawing/2010/main">
+                <a:solidFill>
+                  <a:srgbClr val="FFFFFF"/>
+                </a:solidFill>
+              </a14:hiddenFill>
+            </a:ext>
+          </a:extLst>
+        </p:spPr>
+      </p:pic>
     </p:spTree>
     <p:extLst>
       <p:ext uri="{BB962C8B-B14F-4D97-AF65-F5344CB8AC3E}">
-        <p14:creationId xmlns:p14="http://schemas.microsoft.com/office/powerpoint/2010/main" val="971016089"/>
+        <p14:creationId xmlns:p14="http://schemas.microsoft.com/office/powerpoint/2010/main" val="2935473340"/>
       </p:ext>
     </p:extLst>
   </p:cSld>
@@ -5369,10 +5488,10 @@
       </p:grpSpPr>
       <p:sp>
         <p:nvSpPr>
-          <p:cNvPr id="10" name="Title 1">
+          <p:cNvPr id="2" name="Title 1">
             <a:extLst>
               <a:ext uri="{FF2B5EF4-FFF2-40B4-BE49-F238E27FC236}">
-                <a16:creationId xmlns:a16="http://schemas.microsoft.com/office/drawing/2014/main" id="{02943F23-C5EB-425B-A95D-3C5724C19500}"/>
+                <a16:creationId xmlns:a16="http://schemas.microsoft.com/office/drawing/2014/main" id="{2ADF3388-421B-4AF7-A9D3-8C01B7C143E2}"/>
               </a:ext>
             </a:extLst>
           </p:cNvPr>
@@ -5383,30 +5502,25 @@
             <p:ph type="title"/>
           </p:nvPr>
         </p:nvSpPr>
-        <p:spPr>
-          <a:xfrm>
-            <a:off x="581193" y="729658"/>
-            <a:ext cx="11029616" cy="988332"/>
-          </a:xfrm>
-        </p:spPr>
+        <p:spPr/>
         <p:txBody>
           <a:bodyPr/>
           <a:lstStyle/>
           <a:p>
             <a:r>
               <a:rPr lang="de-DE" dirty="0"/>
-              <a:t>Beispiel zu material ui </a:t>
-            </a:r>
-            <a:endParaRPr lang="en-US" dirty="0"/>
-          </a:p>
-        </p:txBody>
-      </p:sp>
-      <p:sp>
-        <p:nvSpPr>
-          <p:cNvPr id="12" name="Content Placeholder 2">
+              <a:t>Sass</a:t>
+            </a:r>
+            <a:endParaRPr lang="en-US" dirty="0"/>
+          </a:p>
+        </p:txBody>
+      </p:sp>
+      <p:sp>
+        <p:nvSpPr>
+          <p:cNvPr id="3" name="Content Placeholder 2">
             <a:extLst>
               <a:ext uri="{FF2B5EF4-FFF2-40B4-BE49-F238E27FC236}">
-                <a16:creationId xmlns:a16="http://schemas.microsoft.com/office/drawing/2014/main" id="{640716A5-057F-41E3-996D-6636CF524DFA}"/>
+                <a16:creationId xmlns:a16="http://schemas.microsoft.com/office/drawing/2014/main" id="{77780C97-DC9B-4412-8B13-AF471E3CDDC5}"/>
               </a:ext>
             </a:extLst>
           </p:cNvPr>
@@ -5414,88 +5528,43 @@
             <a:spLocks noGrp="1"/>
           </p:cNvSpPr>
           <p:nvPr>
-            <p:ph sz="half" idx="1"/>
-          </p:nvPr>
-        </p:nvSpPr>
-        <p:spPr>
-          <a:xfrm>
-            <a:off x="581193" y="2228003"/>
-            <a:ext cx="5422390" cy="3633047"/>
-          </a:xfrm>
-        </p:spPr>
+            <p:ph idx="1"/>
+          </p:nvPr>
+        </p:nvSpPr>
+        <p:spPr/>
         <p:txBody>
           <a:bodyPr/>
           <a:lstStyle/>
           <a:p>
-            <a:endParaRPr lang="en-US"/>
-          </a:p>
-        </p:txBody>
-      </p:sp>
-      <p:pic>
-        <p:nvPicPr>
-          <p:cNvPr id="4" name="Picture 3" descr="Text&#10;&#10;Description automatically generated">
-            <a:extLst>
-              <a:ext uri="{FF2B5EF4-FFF2-40B4-BE49-F238E27FC236}">
-                <a16:creationId xmlns:a16="http://schemas.microsoft.com/office/drawing/2014/main" id="{27DCEB1F-5865-4A41-A373-046F254994EA}"/>
-              </a:ext>
-            </a:extLst>
-          </p:cNvPr>
-          <p:cNvPicPr>
-            <a:picLocks noChangeAspect="1"/>
-          </p:cNvPicPr>
-          <p:nvPr/>
-        </p:nvPicPr>
-        <p:blipFill>
-          <a:blip r:embed="rId2"/>
-          <a:stretch>
-            <a:fillRect/>
-          </a:stretch>
-        </p:blipFill>
-        <p:spPr>
-          <a:xfrm>
-            <a:off x="5410558" y="2472320"/>
-            <a:ext cx="6564548" cy="3315097"/>
-          </a:xfrm>
-          <a:prstGeom prst="rect">
-            <a:avLst/>
-          </a:prstGeom>
-          <a:noFill/>
-        </p:spPr>
-      </p:pic>
-      <p:pic>
-        <p:nvPicPr>
-          <p:cNvPr id="5" name="Picture 4" descr="Graphical user interface, website&#10;&#10;Description automatically generated">
-            <a:extLst>
-              <a:ext uri="{FF2B5EF4-FFF2-40B4-BE49-F238E27FC236}">
-                <a16:creationId xmlns:a16="http://schemas.microsoft.com/office/drawing/2014/main" id="{5DD66077-9596-4157-8600-0E98009EBC2E}"/>
-              </a:ext>
-            </a:extLst>
-          </p:cNvPr>
-          <p:cNvPicPr>
-            <a:picLocks noChangeAspect="1"/>
-          </p:cNvPicPr>
-          <p:nvPr/>
-        </p:nvPicPr>
-        <p:blipFill>
-          <a:blip r:embed="rId3"/>
-          <a:stretch>
-            <a:fillRect/>
-          </a:stretch>
-        </p:blipFill>
-        <p:spPr>
-          <a:xfrm>
-            <a:off x="465861" y="2839825"/>
-            <a:ext cx="4944697" cy="2580085"/>
-          </a:xfrm>
-          <a:prstGeom prst="rect">
-            <a:avLst/>
-          </a:prstGeom>
-        </p:spPr>
-      </p:pic>
+            <a:r>
+              <a:rPr lang="de-DE" dirty="0"/>
+              <a:t>Entwickler: Natalie Weizenbaum, Chris Eppstein</a:t>
+            </a:r>
+          </a:p>
+          <a:p>
+            <a:r>
+              <a:rPr lang="de-DE" dirty="0"/>
+              <a:t>Erscheinungsjahr: 2012</a:t>
+            </a:r>
+          </a:p>
+          <a:p>
+            <a:r>
+              <a:rPr lang="de-DE" dirty="0"/>
+              <a:t>SASS unterstützt die SCSS-Syntax komplett</a:t>
+            </a:r>
+          </a:p>
+          <a:p>
+            <a:r>
+              <a:rPr lang="de-DE" dirty="0"/>
+              <a:t>Variablen können verwendet werden</a:t>
+            </a:r>
+          </a:p>
+        </p:txBody>
+      </p:sp>
     </p:spTree>
     <p:extLst>
       <p:ext uri="{BB962C8B-B14F-4D97-AF65-F5344CB8AC3E}">
-        <p14:creationId xmlns:p14="http://schemas.microsoft.com/office/powerpoint/2010/main" val="589255746"/>
+        <p14:creationId xmlns:p14="http://schemas.microsoft.com/office/powerpoint/2010/main" val="3646550381"/>
       </p:ext>
     </p:extLst>
   </p:cSld>
@@ -5527,7 +5596,7 @@
           <p:cNvPr id="2" name="Title 1">
             <a:extLst>
               <a:ext uri="{FF2B5EF4-FFF2-40B4-BE49-F238E27FC236}">
-                <a16:creationId xmlns:a16="http://schemas.microsoft.com/office/drawing/2014/main" id="{BE64E176-F085-4247-9DC1-AD331CBC8ACF}"/>
+                <a16:creationId xmlns:a16="http://schemas.microsoft.com/office/drawing/2014/main" id="{4600B480-AA42-45C5-BCB4-0D06C625B169}"/>
               </a:ext>
             </a:extLst>
           </p:cNvPr>
@@ -5538,99 +5607,99 @@
             <p:ph type="title"/>
           </p:nvPr>
         </p:nvSpPr>
-        <p:spPr>
-          <a:xfrm>
-            <a:off x="581192" y="702156"/>
-            <a:ext cx="11029616" cy="1013800"/>
-          </a:xfrm>
-        </p:spPr>
-        <p:txBody>
-          <a:bodyPr anchor="b">
-            <a:normAutofit/>
-          </a:bodyPr>
+        <p:spPr/>
+        <p:txBody>
+          <a:bodyPr/>
           <a:lstStyle/>
           <a:p>
             <a:r>
               <a:rPr lang="de-DE" dirty="0"/>
-              <a:t>Live </a:t>
-            </a:r>
-            <a:r>
-              <a:rPr lang="de-DE" dirty="0" err="1"/>
-              <a:t>demo</a:t>
-            </a:r>
-            <a:endParaRPr lang="en-US" dirty="0"/>
-          </a:p>
-        </p:txBody>
-      </p:sp>
-      <p:pic>
-        <p:nvPicPr>
-          <p:cNvPr id="6" name="Content Placeholder 5" descr="Shape&#10;&#10;Description automatically generated with low confidence">
+              <a:t>TypeScript</a:t>
+            </a:r>
+            <a:endParaRPr lang="en-US" dirty="0"/>
+          </a:p>
+        </p:txBody>
+      </p:sp>
+      <p:sp>
+        <p:nvSpPr>
+          <p:cNvPr id="3" name="Content Placeholder 2">
             <a:extLst>
               <a:ext uri="{FF2B5EF4-FFF2-40B4-BE49-F238E27FC236}">
-                <a16:creationId xmlns:a16="http://schemas.microsoft.com/office/drawing/2014/main" id="{882D8896-0F3B-4CF1-A37B-B57FCF363071}"/>
+                <a16:creationId xmlns:a16="http://schemas.microsoft.com/office/drawing/2014/main" id="{9E6CA42C-39BF-4909-AD56-CD335BF350E5}"/>
               </a:ext>
             </a:extLst>
           </p:cNvPr>
-          <p:cNvPicPr>
-            <a:picLocks noGrp="1" noChangeAspect="1"/>
-          </p:cNvPicPr>
+          <p:cNvSpPr>
+            <a:spLocks noGrp="1"/>
+          </p:cNvSpPr>
           <p:nvPr>
             <p:ph idx="1"/>
           </p:nvPr>
-        </p:nvPicPr>
-        <p:blipFill>
-          <a:blip r:embed="rId2"/>
-          <a:stretch>
-            <a:fillRect/>
-          </a:stretch>
-        </p:blipFill>
-        <p:spPr>
-          <a:xfrm>
-            <a:off x="4256848" y="2180496"/>
-            <a:ext cx="3678303" cy="3678303"/>
-          </a:xfrm>
-          <a:noFill/>
-        </p:spPr>
-      </p:pic>
-      <p:sp>
-        <p:nvSpPr>
-          <p:cNvPr id="7" name="TextBox 6">
-            <a:extLst>
-              <a:ext uri="{FF2B5EF4-FFF2-40B4-BE49-F238E27FC236}">
-                <a16:creationId xmlns:a16="http://schemas.microsoft.com/office/drawing/2014/main" id="{8E4F3134-9A90-4A49-95A1-01521C8B021D}"/>
-              </a:ext>
-            </a:extLst>
-          </p:cNvPr>
-          <p:cNvSpPr txBox="1"/>
-          <p:nvPr/>
-        </p:nvSpPr>
-        <p:spPr>
-          <a:xfrm>
-            <a:off x="10009632" y="6638247"/>
-            <a:ext cx="2462784" cy="215444"/>
-          </a:xfrm>
-          <a:prstGeom prst="rect">
-            <a:avLst/>
-          </a:prstGeom>
-          <a:noFill/>
-        </p:spPr>
-        <p:txBody>
-          <a:bodyPr wrap="square" rtlCol="0">
-            <a:spAutoFit/>
-          </a:bodyPr>
+        </p:nvSpPr>
+        <p:spPr/>
+        <p:txBody>
+          <a:bodyPr/>
           <a:lstStyle/>
           <a:p>
             <a:r>
-              <a:rPr lang="en-US" sz="800" dirty="0"/>
-              <a:t>https://www.flaticon.com/de/autoren/wahyu-adam</a:t>
-            </a:r>
+              <a:rPr lang="de-DE" dirty="0"/>
+              <a:t>Entwickler: Microsoft</a:t>
+            </a:r>
+          </a:p>
+          <a:p>
+            <a:r>
+              <a:rPr lang="de-DE" dirty="0"/>
+              <a:t>Erscheinungsjahr: 2012</a:t>
+            </a:r>
+          </a:p>
+          <a:p>
+            <a:r>
+              <a:rPr lang="de-DE" dirty="0"/>
+              <a:t>Vorteile:</a:t>
+            </a:r>
+          </a:p>
+          <a:p>
+            <a:pPr lvl="1"/>
+            <a:r>
+              <a:rPr lang="de-DE" dirty="0"/>
+              <a:t>Einfachere </a:t>
+            </a:r>
+            <a:r>
+              <a:rPr lang="de-DE" dirty="0" err="1"/>
+              <a:t>arbeit</a:t>
+            </a:r>
+            <a:r>
+              <a:rPr lang="de-DE" dirty="0"/>
+              <a:t> mit Datentypen</a:t>
+            </a:r>
+          </a:p>
+          <a:p>
+            <a:pPr lvl="1"/>
+            <a:r>
+              <a:rPr lang="de-DE" dirty="0"/>
+              <a:t>Weniger </a:t>
+            </a:r>
+            <a:r>
+              <a:rPr lang="de-DE" dirty="0" err="1"/>
+              <a:t>RunTime</a:t>
+            </a:r>
+            <a:r>
+              <a:rPr lang="de-DE" dirty="0"/>
+              <a:t> Errors</a:t>
+            </a:r>
+          </a:p>
+          <a:p>
+            <a:endParaRPr lang="de-DE" dirty="0"/>
+          </a:p>
+          <a:p>
+            <a:endParaRPr lang="en-US" dirty="0"/>
           </a:p>
         </p:txBody>
       </p:sp>
     </p:spTree>
     <p:extLst>
       <p:ext uri="{BB962C8B-B14F-4D97-AF65-F5344CB8AC3E}">
-        <p14:creationId xmlns:p14="http://schemas.microsoft.com/office/powerpoint/2010/main" val="909792729"/>
+        <p14:creationId xmlns:p14="http://schemas.microsoft.com/office/powerpoint/2010/main" val="2188900832"/>
       </p:ext>
     </p:extLst>
   </p:cSld>
@@ -5662,6 +5731,263 @@
           <p:cNvPr id="2" name="Title 1">
             <a:extLst>
               <a:ext uri="{FF2B5EF4-FFF2-40B4-BE49-F238E27FC236}">
+                <a16:creationId xmlns:a16="http://schemas.microsoft.com/office/drawing/2014/main" id="{D12AEE22-D569-4E5C-99F8-63D5DB21A456}"/>
+              </a:ext>
+            </a:extLst>
+          </p:cNvPr>
+          <p:cNvSpPr>
+            <a:spLocks noGrp="1"/>
+          </p:cNvSpPr>
+          <p:nvPr>
+            <p:ph type="title"/>
+          </p:nvPr>
+        </p:nvSpPr>
+        <p:spPr/>
+        <p:txBody>
+          <a:bodyPr/>
+          <a:lstStyle/>
+          <a:p>
+            <a:r>
+              <a:rPr lang="de-DE" dirty="0"/>
+              <a:t>Material UI</a:t>
+            </a:r>
+            <a:endParaRPr lang="en-US" dirty="0"/>
+          </a:p>
+        </p:txBody>
+      </p:sp>
+      <p:sp>
+        <p:nvSpPr>
+          <p:cNvPr id="3" name="Content Placeholder 2">
+            <a:extLst>
+              <a:ext uri="{FF2B5EF4-FFF2-40B4-BE49-F238E27FC236}">
+                <a16:creationId xmlns:a16="http://schemas.microsoft.com/office/drawing/2014/main" id="{3BDE542D-5B6D-49F6-8946-D595602E9432}"/>
+              </a:ext>
+            </a:extLst>
+          </p:cNvPr>
+          <p:cNvSpPr>
+            <a:spLocks noGrp="1"/>
+          </p:cNvSpPr>
+          <p:nvPr>
+            <p:ph idx="1"/>
+          </p:nvPr>
+        </p:nvSpPr>
+        <p:spPr/>
+        <p:txBody>
+          <a:bodyPr/>
+          <a:lstStyle/>
+          <a:p>
+            <a:r>
+              <a:rPr lang="de-DE" dirty="0"/>
+              <a:t>UI Framework</a:t>
+            </a:r>
+          </a:p>
+          <a:p>
+            <a:r>
+              <a:rPr lang="de-DE" dirty="0"/>
+              <a:t>Komponente sind nicht angewiesen auf andere Erweiterungen</a:t>
+            </a:r>
+          </a:p>
+          <a:p>
+            <a:r>
+              <a:rPr lang="de-DE" dirty="0"/>
+              <a:t>Gut ausgearbeitet Dokumentation sowie Beispiele</a:t>
+            </a:r>
+          </a:p>
+          <a:p>
+            <a:endParaRPr lang="en-US" dirty="0"/>
+          </a:p>
+        </p:txBody>
+      </p:sp>
+    </p:spTree>
+    <p:extLst>
+      <p:ext uri="{BB962C8B-B14F-4D97-AF65-F5344CB8AC3E}">
+        <p14:creationId xmlns:p14="http://schemas.microsoft.com/office/powerpoint/2010/main" val="971016089"/>
+      </p:ext>
+    </p:extLst>
+  </p:cSld>
+  <p:clrMapOvr>
+    <a:masterClrMapping/>
+  </p:clrMapOvr>
+</p:sld>
+</file>
+
+<file path=ppt/slides/slide15.xml><?xml version="1.0" encoding="utf-8"?>
+<p:sld xmlns:a="http://schemas.openxmlformats.org/drawingml/2006/main" xmlns:r="http://schemas.openxmlformats.org/officeDocument/2006/relationships" xmlns:p="http://schemas.openxmlformats.org/presentationml/2006/main">
+  <p:cSld>
+    <p:spTree>
+      <p:nvGrpSpPr>
+        <p:cNvPr id="1" name=""/>
+        <p:cNvGrpSpPr/>
+        <p:nvPr/>
+      </p:nvGrpSpPr>
+      <p:grpSpPr>
+        <a:xfrm>
+          <a:off x="0" y="0"/>
+          <a:ext cx="0" cy="0"/>
+          <a:chOff x="0" y="0"/>
+          <a:chExt cx="0" cy="0"/>
+        </a:xfrm>
+      </p:grpSpPr>
+      <p:sp>
+        <p:nvSpPr>
+          <p:cNvPr id="10" name="Title 1">
+            <a:extLst>
+              <a:ext uri="{FF2B5EF4-FFF2-40B4-BE49-F238E27FC236}">
+                <a16:creationId xmlns:a16="http://schemas.microsoft.com/office/drawing/2014/main" id="{02943F23-C5EB-425B-A95D-3C5724C19500}"/>
+              </a:ext>
+            </a:extLst>
+          </p:cNvPr>
+          <p:cNvSpPr>
+            <a:spLocks noGrp="1"/>
+          </p:cNvSpPr>
+          <p:nvPr>
+            <p:ph type="title"/>
+          </p:nvPr>
+        </p:nvSpPr>
+        <p:spPr>
+          <a:xfrm>
+            <a:off x="581193" y="729658"/>
+            <a:ext cx="11029616" cy="988332"/>
+          </a:xfrm>
+        </p:spPr>
+        <p:txBody>
+          <a:bodyPr/>
+          <a:lstStyle/>
+          <a:p>
+            <a:r>
+              <a:rPr lang="de-DE" dirty="0"/>
+              <a:t>Beispiel zu material ui </a:t>
+            </a:r>
+            <a:endParaRPr lang="en-US" dirty="0"/>
+          </a:p>
+        </p:txBody>
+      </p:sp>
+      <p:sp>
+        <p:nvSpPr>
+          <p:cNvPr id="12" name="Content Placeholder 2">
+            <a:extLst>
+              <a:ext uri="{FF2B5EF4-FFF2-40B4-BE49-F238E27FC236}">
+                <a16:creationId xmlns:a16="http://schemas.microsoft.com/office/drawing/2014/main" id="{640716A5-057F-41E3-996D-6636CF524DFA}"/>
+              </a:ext>
+            </a:extLst>
+          </p:cNvPr>
+          <p:cNvSpPr>
+            <a:spLocks noGrp="1"/>
+          </p:cNvSpPr>
+          <p:nvPr>
+            <p:ph sz="half" idx="1"/>
+          </p:nvPr>
+        </p:nvSpPr>
+        <p:spPr>
+          <a:xfrm>
+            <a:off x="581193" y="2228003"/>
+            <a:ext cx="5422390" cy="3633047"/>
+          </a:xfrm>
+        </p:spPr>
+        <p:txBody>
+          <a:bodyPr/>
+          <a:lstStyle/>
+          <a:p>
+            <a:endParaRPr lang="en-US"/>
+          </a:p>
+        </p:txBody>
+      </p:sp>
+      <p:pic>
+        <p:nvPicPr>
+          <p:cNvPr id="4" name="Picture 3" descr="Text&#10;&#10;Description automatically generated">
+            <a:extLst>
+              <a:ext uri="{FF2B5EF4-FFF2-40B4-BE49-F238E27FC236}">
+                <a16:creationId xmlns:a16="http://schemas.microsoft.com/office/drawing/2014/main" id="{27DCEB1F-5865-4A41-A373-046F254994EA}"/>
+              </a:ext>
+            </a:extLst>
+          </p:cNvPr>
+          <p:cNvPicPr>
+            <a:picLocks noChangeAspect="1"/>
+          </p:cNvPicPr>
+          <p:nvPr/>
+        </p:nvPicPr>
+        <p:blipFill>
+          <a:blip r:embed="rId2"/>
+          <a:stretch>
+            <a:fillRect/>
+          </a:stretch>
+        </p:blipFill>
+        <p:spPr>
+          <a:xfrm>
+            <a:off x="5410558" y="2472320"/>
+            <a:ext cx="6564548" cy="3315097"/>
+          </a:xfrm>
+          <a:prstGeom prst="rect">
+            <a:avLst/>
+          </a:prstGeom>
+          <a:noFill/>
+        </p:spPr>
+      </p:pic>
+      <p:pic>
+        <p:nvPicPr>
+          <p:cNvPr id="5" name="Picture 4" descr="Graphical user interface, website&#10;&#10;Description automatically generated">
+            <a:extLst>
+              <a:ext uri="{FF2B5EF4-FFF2-40B4-BE49-F238E27FC236}">
+                <a16:creationId xmlns:a16="http://schemas.microsoft.com/office/drawing/2014/main" id="{5DD66077-9596-4157-8600-0E98009EBC2E}"/>
+              </a:ext>
+            </a:extLst>
+          </p:cNvPr>
+          <p:cNvPicPr>
+            <a:picLocks noChangeAspect="1"/>
+          </p:cNvPicPr>
+          <p:nvPr/>
+        </p:nvPicPr>
+        <p:blipFill>
+          <a:blip r:embed="rId3"/>
+          <a:stretch>
+            <a:fillRect/>
+          </a:stretch>
+        </p:blipFill>
+        <p:spPr>
+          <a:xfrm>
+            <a:off x="465861" y="2839825"/>
+            <a:ext cx="4944697" cy="2580085"/>
+          </a:xfrm>
+          <a:prstGeom prst="rect">
+            <a:avLst/>
+          </a:prstGeom>
+        </p:spPr>
+      </p:pic>
+    </p:spTree>
+    <p:extLst>
+      <p:ext uri="{BB962C8B-B14F-4D97-AF65-F5344CB8AC3E}">
+        <p14:creationId xmlns:p14="http://schemas.microsoft.com/office/powerpoint/2010/main" val="589255746"/>
+      </p:ext>
+    </p:extLst>
+  </p:cSld>
+  <p:clrMapOvr>
+    <a:masterClrMapping/>
+  </p:clrMapOvr>
+</p:sld>
+</file>
+
+<file path=ppt/slides/slide16.xml><?xml version="1.0" encoding="utf-8"?>
+<p:sld xmlns:a="http://schemas.openxmlformats.org/drawingml/2006/main" xmlns:r="http://schemas.openxmlformats.org/officeDocument/2006/relationships" xmlns:p="http://schemas.openxmlformats.org/presentationml/2006/main">
+  <p:cSld>
+    <p:spTree>
+      <p:nvGrpSpPr>
+        <p:cNvPr id="1" name=""/>
+        <p:cNvGrpSpPr/>
+        <p:nvPr/>
+      </p:nvGrpSpPr>
+      <p:grpSpPr>
+        <a:xfrm>
+          <a:off x="0" y="0"/>
+          <a:ext cx="0" cy="0"/>
+          <a:chOff x="0" y="0"/>
+          <a:chExt cx="0" cy="0"/>
+        </a:xfrm>
+      </p:grpSpPr>
+      <p:sp>
+        <p:nvSpPr>
+          <p:cNvPr id="2" name="Title 1">
+            <a:extLst>
+              <a:ext uri="{FF2B5EF4-FFF2-40B4-BE49-F238E27FC236}">
                 <a16:creationId xmlns:a16="http://schemas.microsoft.com/office/drawing/2014/main" id="{80E130B7-6D6F-4276-8C64-D4F3BBC11A1B}"/>
               </a:ext>
             </a:extLst>
@@ -5745,7 +6071,7 @@
 </p:sld>
 </file>
 
-<file path=ppt/slides/slide15.xml><?xml version="1.0" encoding="utf-8"?>
+<file path=ppt/slides/slide17.xml><?xml version="1.0" encoding="utf-8"?>
 <p:sld xmlns:a="http://schemas.openxmlformats.org/drawingml/2006/main" xmlns:r="http://schemas.openxmlformats.org/officeDocument/2006/relationships" xmlns:p="http://schemas.openxmlformats.org/presentationml/2006/main">
   <p:cSld>
     <p:bg>
@@ -6222,6 +6548,10 @@
           <a:bodyPr/>
           <a:lstStyle/>
           <a:p>
+            <a:r>
+              <a:rPr lang="de-DE" dirty="0" err="1"/>
+              <a:t>Inhaltsverzeihnis</a:t>
+            </a:r>
             <a:endParaRPr lang="en-US" dirty="0"/>
           </a:p>
         </p:txBody>
@@ -6244,10 +6574,125 @@
         </p:nvSpPr>
         <p:spPr/>
         <p:txBody>
-          <a:bodyPr/>
+          <a:bodyPr>
+            <a:normAutofit fontScale="77500" lnSpcReduction="20000"/>
+          </a:bodyPr>
           <a:lstStyle/>
           <a:p>
-            <a:endParaRPr lang="en-US"/>
+            <a:r>
+              <a:rPr lang="de-DE" dirty="0">
+                <a:hlinkClick r:id="rId2" action="ppaction://hlinksldjump"/>
+              </a:rPr>
+              <a:t>Live Demo</a:t>
+            </a:r>
+            <a:endParaRPr lang="de-DE" u="sng" dirty="0">
+              <a:hlinkClick r:id="rId3" action="ppaction://hlinksldjump"/>
+            </a:endParaRPr>
+          </a:p>
+          <a:p>
+            <a:r>
+              <a:rPr lang="de-DE" u="sng" dirty="0">
+                <a:hlinkClick r:id="rId3" action="ppaction://hlinksldjump"/>
+              </a:rPr>
+              <a:t>React</a:t>
+            </a:r>
+            <a:endParaRPr lang="en-US" u="sng" dirty="0"/>
+          </a:p>
+          <a:p>
+            <a:pPr lvl="1"/>
+            <a:r>
+              <a:rPr lang="de-DE" dirty="0"/>
+              <a:t>Rendering Konzept</a:t>
+            </a:r>
+            <a:endParaRPr lang="en-US" dirty="0"/>
+          </a:p>
+          <a:p>
+            <a:pPr lvl="1"/>
+            <a:r>
+              <a:rPr lang="de-DE" dirty="0"/>
+              <a:t>Komponente</a:t>
+            </a:r>
+            <a:endParaRPr lang="en-US" dirty="0"/>
+          </a:p>
+          <a:p>
+            <a:pPr lvl="1"/>
+            <a:r>
+              <a:rPr lang="de-DE" dirty="0"/>
+              <a:t>Lifecycle</a:t>
+            </a:r>
+            <a:endParaRPr lang="en-US" dirty="0"/>
+          </a:p>
+          <a:p>
+            <a:pPr lvl="1"/>
+            <a:r>
+              <a:rPr lang="de-DE" dirty="0"/>
+              <a:t>State</a:t>
+            </a:r>
+            <a:endParaRPr lang="en-US" dirty="0"/>
+          </a:p>
+          <a:p>
+            <a:pPr lvl="1"/>
+            <a:r>
+              <a:rPr lang="de-DE" dirty="0"/>
+              <a:t>Recoil</a:t>
+            </a:r>
+            <a:endParaRPr lang="en-US" dirty="0"/>
+          </a:p>
+          <a:p>
+            <a:pPr lvl="1"/>
+            <a:r>
+              <a:rPr lang="de-DE" dirty="0"/>
+              <a:t>Routing</a:t>
+            </a:r>
+            <a:endParaRPr lang="en-US" dirty="0"/>
+          </a:p>
+          <a:p>
+            <a:r>
+              <a:rPr lang="de-DE" dirty="0">
+                <a:hlinkClick r:id="rId4" action="ppaction://hlinksldjump"/>
+              </a:rPr>
+              <a:t>Sass</a:t>
+            </a:r>
+            <a:endParaRPr lang="en-US" dirty="0"/>
+          </a:p>
+          <a:p>
+            <a:r>
+              <a:rPr lang="de-DE" dirty="0">
+                <a:hlinkClick r:id="rId5" action="ppaction://hlinksldjump"/>
+              </a:rPr>
+              <a:t>TypeScript</a:t>
+            </a:r>
+            <a:endParaRPr lang="en-US" dirty="0"/>
+          </a:p>
+          <a:p>
+            <a:r>
+              <a:rPr lang="de-DE" dirty="0">
+                <a:hlinkClick r:id="rId6" action="ppaction://hlinksldjump"/>
+              </a:rPr>
+              <a:t>Material UI</a:t>
+            </a:r>
+            <a:endParaRPr lang="en-US" dirty="0"/>
+          </a:p>
+          <a:p>
+            <a:pPr lvl="1"/>
+            <a:r>
+              <a:rPr lang="de-DE" dirty="0"/>
+              <a:t>Beispiel zu material ui </a:t>
+            </a:r>
+            <a:endParaRPr lang="en-US" dirty="0"/>
+          </a:p>
+          <a:p>
+            <a:r>
+              <a:rPr lang="de-DE" dirty="0">
+                <a:hlinkClick r:id="rId7" action="ppaction://hlinksldjump"/>
+              </a:rPr>
+              <a:t>ZUKUNFT</a:t>
+            </a:r>
+            <a:endParaRPr lang="en-US" dirty="0"/>
+          </a:p>
+          <a:p>
+            <a:pPr lvl="1"/>
+            <a:endParaRPr lang="en-US" dirty="0"/>
           </a:p>
         </p:txBody>
       </p:sp>
@@ -6286,7 +6731,7 @@
           <p:cNvPr id="2" name="Title 1">
             <a:extLst>
               <a:ext uri="{FF2B5EF4-FFF2-40B4-BE49-F238E27FC236}">
-                <a16:creationId xmlns:a16="http://schemas.microsoft.com/office/drawing/2014/main" id="{22F1DEBF-BC7F-42E2-A747-A4F1643D65AA}"/>
+                <a16:creationId xmlns:a16="http://schemas.microsoft.com/office/drawing/2014/main" id="{BE64E176-F085-4247-9DC1-AD331CBC8ACF}"/>
               </a:ext>
             </a:extLst>
           </p:cNvPr>
@@ -6297,102 +6742,100 @@
             <p:ph type="title"/>
           </p:nvPr>
         </p:nvSpPr>
-        <p:spPr/>
-        <p:txBody>
-          <a:bodyPr/>
+        <p:spPr>
+          <a:xfrm>
+            <a:off x="581192" y="702156"/>
+            <a:ext cx="11029616" cy="1013800"/>
+          </a:xfrm>
+        </p:spPr>
+        <p:txBody>
+          <a:bodyPr anchor="b">
+            <a:normAutofit/>
+          </a:bodyPr>
           <a:lstStyle/>
           <a:p>
             <a:r>
               <a:rPr lang="de-DE" dirty="0"/>
-              <a:t>Was ist </a:t>
+              <a:t>Live </a:t>
             </a:r>
             <a:r>
               <a:rPr lang="de-DE" dirty="0" err="1"/>
-              <a:t>react</a:t>
-            </a:r>
-            <a:r>
-              <a:rPr lang="de-DE" dirty="0"/>
-              <a:t>?</a:t>
-            </a:r>
-            <a:endParaRPr lang="en-US" dirty="0"/>
-          </a:p>
-        </p:txBody>
-      </p:sp>
-      <p:sp>
-        <p:nvSpPr>
-          <p:cNvPr id="3" name="Content Placeholder 2">
+              <a:t>demo</a:t>
+            </a:r>
+            <a:endParaRPr lang="en-US" dirty="0"/>
+          </a:p>
+        </p:txBody>
+      </p:sp>
+      <p:pic>
+        <p:nvPicPr>
+          <p:cNvPr id="6" name="Content Placeholder 5" descr="Shape&#10;&#10;Description automatically generated with low confidence">
+            <a:hlinkClick r:id="rId2"/>
             <a:extLst>
               <a:ext uri="{FF2B5EF4-FFF2-40B4-BE49-F238E27FC236}">
-                <a16:creationId xmlns:a16="http://schemas.microsoft.com/office/drawing/2014/main" id="{5A216DCC-0719-4CB7-A89A-80DB46BA7045}"/>
+                <a16:creationId xmlns:a16="http://schemas.microsoft.com/office/drawing/2014/main" id="{882D8896-0F3B-4CF1-A37B-B57FCF363071}"/>
               </a:ext>
             </a:extLst>
           </p:cNvPr>
-          <p:cNvSpPr>
-            <a:spLocks noGrp="1"/>
-          </p:cNvSpPr>
+          <p:cNvPicPr>
+            <a:picLocks noGrp="1" noChangeAspect="1"/>
+          </p:cNvPicPr>
           <p:nvPr>
             <p:ph idx="1"/>
           </p:nvPr>
-        </p:nvSpPr>
-        <p:spPr/>
-        <p:txBody>
-          <a:bodyPr/>
+        </p:nvPicPr>
+        <p:blipFill>
+          <a:blip r:embed="rId3"/>
+          <a:stretch>
+            <a:fillRect/>
+          </a:stretch>
+        </p:blipFill>
+        <p:spPr>
+          <a:xfrm>
+            <a:off x="4256848" y="2337950"/>
+            <a:ext cx="3678303" cy="3678303"/>
+          </a:xfrm>
+          <a:noFill/>
+        </p:spPr>
+      </p:pic>
+      <p:sp>
+        <p:nvSpPr>
+          <p:cNvPr id="7" name="TextBox 6">
+            <a:extLst>
+              <a:ext uri="{FF2B5EF4-FFF2-40B4-BE49-F238E27FC236}">
+                <a16:creationId xmlns:a16="http://schemas.microsoft.com/office/drawing/2014/main" id="{8E4F3134-9A90-4A49-95A1-01521C8B021D}"/>
+              </a:ext>
+            </a:extLst>
+          </p:cNvPr>
+          <p:cNvSpPr txBox="1"/>
+          <p:nvPr/>
+        </p:nvSpPr>
+        <p:spPr>
+          <a:xfrm>
+            <a:off x="10009632" y="6638247"/>
+            <a:ext cx="2462784" cy="215444"/>
+          </a:xfrm>
+          <a:prstGeom prst="rect">
+            <a:avLst/>
+          </a:prstGeom>
+          <a:noFill/>
+        </p:spPr>
+        <p:txBody>
+          <a:bodyPr wrap="square" rtlCol="0">
+            <a:spAutoFit/>
+          </a:bodyPr>
           <a:lstStyle/>
           <a:p>
             <a:r>
-              <a:rPr lang="de-DE" dirty="0" err="1"/>
-              <a:t>Maintainer</a:t>
-            </a:r>
-            <a:r>
-              <a:rPr lang="de-DE" dirty="0"/>
-              <a:t>: </a:t>
-            </a:r>
-            <a:r>
-              <a:rPr lang="de-DE" dirty="0" err="1"/>
-              <a:t>Meta</a:t>
-            </a:r>
-            <a:r>
-              <a:rPr lang="de-DE" dirty="0"/>
-              <a:t> </a:t>
-            </a:r>
-            <a:r>
-              <a:rPr lang="de-DE" dirty="0" err="1"/>
-              <a:t>Platforms</a:t>
-            </a:r>
-            <a:endParaRPr lang="de-DE" dirty="0"/>
-          </a:p>
-          <a:p>
-            <a:r>
-              <a:rPr lang="de-DE" dirty="0"/>
-              <a:t>Entwickler: Facebook</a:t>
-            </a:r>
-          </a:p>
-          <a:p>
-            <a:r>
-              <a:rPr lang="de-DE" dirty="0"/>
-              <a:t>Erscheinungsjahr: 2013</a:t>
-            </a:r>
-          </a:p>
-          <a:p>
-            <a:r>
-              <a:rPr lang="de-DE" dirty="0"/>
-              <a:t>Programmiersprache: JavaScript/</a:t>
-            </a:r>
-            <a:r>
-              <a:rPr lang="de-DE" dirty="0" err="1"/>
-              <a:t>TypeScript</a:t>
-            </a:r>
-            <a:endParaRPr lang="de-DE" dirty="0"/>
-          </a:p>
-          <a:p>
-            <a:endParaRPr lang="en-US" dirty="0"/>
+              <a:rPr lang="en-US" sz="800" dirty="0"/>
+              <a:t>https://www.flaticon.com/de/autoren/wahyu-adam</a:t>
+            </a:r>
           </a:p>
         </p:txBody>
       </p:sp>
     </p:spTree>
     <p:extLst>
       <p:ext uri="{BB962C8B-B14F-4D97-AF65-F5344CB8AC3E}">
-        <p14:creationId xmlns:p14="http://schemas.microsoft.com/office/powerpoint/2010/main" val="4275207972"/>
+        <p14:creationId xmlns:p14="http://schemas.microsoft.com/office/powerpoint/2010/main" val="909792729"/>
       </p:ext>
     </p:extLst>
   </p:cSld>
@@ -6421,10 +6864,10 @@
       </p:grpSpPr>
       <p:sp>
         <p:nvSpPr>
-          <p:cNvPr id="10" name="Title 1">
+          <p:cNvPr id="2" name="Title 1">
             <a:extLst>
               <a:ext uri="{FF2B5EF4-FFF2-40B4-BE49-F238E27FC236}">
-                <a16:creationId xmlns:a16="http://schemas.microsoft.com/office/drawing/2014/main" id="{3A01486D-0BBA-40F6-804A-EAD9D61B51BB}"/>
+                <a16:creationId xmlns:a16="http://schemas.microsoft.com/office/drawing/2014/main" id="{22F1DEBF-BC7F-42E2-A747-A4F1643D65AA}"/>
               </a:ext>
             </a:extLst>
           </p:cNvPr>
@@ -6442,16 +6885,99 @@
           </a:xfrm>
         </p:spPr>
         <p:txBody>
-          <a:bodyPr/>
+          <a:bodyPr anchor="b">
+            <a:normAutofit/>
+          </a:bodyPr>
           <a:lstStyle/>
           <a:p>
             <a:r>
               <a:rPr lang="de-DE" dirty="0"/>
-              <a:t>RENDERING </a:t>
+              <a:t>Was ist </a:t>
             </a:r>
             <a:r>
               <a:rPr lang="de-DE" dirty="0" err="1"/>
-              <a:t>KONzEPT</a:t>
+              <a:t>react</a:t>
+            </a:r>
+            <a:r>
+              <a:rPr lang="de-DE" dirty="0"/>
+              <a:t>?</a:t>
+            </a:r>
+            <a:endParaRPr lang="en-US" dirty="0"/>
+          </a:p>
+        </p:txBody>
+      </p:sp>
+      <p:sp>
+        <p:nvSpPr>
+          <p:cNvPr id="3" name="Content Placeholder 2">
+            <a:extLst>
+              <a:ext uri="{FF2B5EF4-FFF2-40B4-BE49-F238E27FC236}">
+                <a16:creationId xmlns:a16="http://schemas.microsoft.com/office/drawing/2014/main" id="{5A216DCC-0719-4CB7-A89A-80DB46BA7045}"/>
+              </a:ext>
+            </a:extLst>
+          </p:cNvPr>
+          <p:cNvSpPr>
+            <a:spLocks noGrp="1"/>
+          </p:cNvSpPr>
+          <p:nvPr>
+            <p:ph sz="half" idx="1"/>
+          </p:nvPr>
+        </p:nvSpPr>
+        <p:spPr>
+          <a:xfrm>
+            <a:off x="581193" y="2228003"/>
+            <a:ext cx="5422390" cy="3633047"/>
+          </a:xfrm>
+        </p:spPr>
+        <p:txBody>
+          <a:bodyPr anchor="ctr">
+            <a:normAutofit/>
+          </a:bodyPr>
+          <a:lstStyle/>
+          <a:p>
+            <a:r>
+              <a:rPr lang="de-DE" dirty="0" err="1"/>
+              <a:t>Maintainer</a:t>
+            </a:r>
+            <a:r>
+              <a:rPr lang="de-DE" dirty="0"/>
+              <a:t>: </a:t>
+            </a:r>
+            <a:r>
+              <a:rPr lang="de-DE" dirty="0" err="1"/>
+              <a:t>Meta</a:t>
+            </a:r>
+            <a:r>
+              <a:rPr lang="de-DE" dirty="0"/>
+              <a:t> </a:t>
+            </a:r>
+            <a:r>
+              <a:rPr lang="de-DE" dirty="0" err="1"/>
+              <a:t>Platforms</a:t>
+            </a:r>
+            <a:endParaRPr lang="de-DE" dirty="0"/>
+          </a:p>
+          <a:p>
+            <a:r>
+              <a:rPr lang="de-DE" dirty="0"/>
+              <a:t>Entwickler: Facebook</a:t>
+            </a:r>
+          </a:p>
+          <a:p>
+            <a:r>
+              <a:rPr lang="de-DE" dirty="0"/>
+              <a:t>Erscheinungsjahr: 2013</a:t>
+            </a:r>
+          </a:p>
+          <a:p>
+            <a:r>
+              <a:rPr lang="de-DE" dirty="0"/>
+              <a:t>Programmiersprache: JavaScript/TypeScript</a:t>
+            </a:r>
+          </a:p>
+          <a:p>
+            <a:r>
+              <a:rPr lang="de-DE" dirty="0"/>
+              <a:t>Single-Page-Webanwendungen</a:t>
             </a:r>
             <a:endParaRPr lang="en-US" dirty="0"/>
           </a:p>
@@ -6459,260 +6985,56 @@
       </p:sp>
       <p:pic>
         <p:nvPicPr>
-          <p:cNvPr id="5" name="Picture 4" descr="Graphical user interface, text&#10;&#10;Description automatically generated">
+          <p:cNvPr id="3074" name="Picture 2" descr="React – Wikipedia">
             <a:extLst>
               <a:ext uri="{FF2B5EF4-FFF2-40B4-BE49-F238E27FC236}">
-                <a16:creationId xmlns:a16="http://schemas.microsoft.com/office/drawing/2014/main" id="{4D2B1214-24D9-4D9F-BFC3-F5C54A7A94DD}"/>
+                <a16:creationId xmlns:a16="http://schemas.microsoft.com/office/drawing/2014/main" id="{9E223951-2BB0-4875-875C-B680178E0B8C}"/>
               </a:ext>
             </a:extLst>
           </p:cNvPr>
           <p:cNvPicPr>
-            <a:picLocks noChangeAspect="1"/>
+            <a:picLocks noChangeAspect="1" noChangeArrowheads="1"/>
           </p:cNvPicPr>
           <p:nvPr/>
         </p:nvPicPr>
         <p:blipFill>
-          <a:blip r:embed="rId2"/>
+          <a:blip r:embed="rId2">
+            <a:extLst>
+              <a:ext uri="{28A0092B-C50C-407E-A947-70E740481C1C}">
+                <a14:useLocalDpi xmlns:a14="http://schemas.microsoft.com/office/drawing/2010/main" val="0"/>
+              </a:ext>
+            </a:extLst>
+          </a:blip>
           <a:stretch>
             <a:fillRect/>
           </a:stretch>
         </p:blipFill>
-        <p:spPr>
-          <a:xfrm>
-            <a:off x="2153077" y="2228003"/>
-            <a:ext cx="2278621" cy="3633047"/>
+        <p:spPr bwMode="auto">
+          <a:xfrm>
+            <a:off x="6804961" y="2228003"/>
+            <a:ext cx="4189303" cy="3633047"/>
           </a:xfrm>
           <a:prstGeom prst="rect">
             <a:avLst/>
           </a:prstGeom>
-          <a:noFill/>
+          <a:solidFill>
+            <a:srgbClr val="FFFFFF"/>
+          </a:solidFill>
+          <a:extLst>
+            <a:ext uri="{909E8E84-426E-40DD-AFC4-6F175D3DCCD1}">
+              <a14:hiddenFill xmlns:a14="http://schemas.microsoft.com/office/drawing/2010/main">
+                <a:solidFill>
+                  <a:srgbClr val="FFFFFF"/>
+                </a:solidFill>
+              </a14:hiddenFill>
+            </a:ext>
+          </a:extLst>
         </p:spPr>
       </p:pic>
-      <p:sp>
-        <p:nvSpPr>
-          <p:cNvPr id="3" name="Content Placeholder 2">
-            <a:extLst>
-              <a:ext uri="{FF2B5EF4-FFF2-40B4-BE49-F238E27FC236}">
-                <a16:creationId xmlns:a16="http://schemas.microsoft.com/office/drawing/2014/main" id="{14D9B0ED-4C0F-490A-A71E-77D37C733849}"/>
-              </a:ext>
-            </a:extLst>
-          </p:cNvPr>
-          <p:cNvSpPr>
-            <a:spLocks noGrp="1"/>
-          </p:cNvSpPr>
-          <p:nvPr>
-            <p:ph sz="half" idx="2"/>
-          </p:nvPr>
-        </p:nvSpPr>
-        <p:spPr>
-          <a:xfrm>
-            <a:off x="5522976" y="2228003"/>
-            <a:ext cx="6087833" cy="988333"/>
-          </a:xfrm>
-        </p:spPr>
-        <p:txBody>
-          <a:bodyPr anchor="ctr">
-            <a:normAutofit/>
-          </a:bodyPr>
-          <a:lstStyle/>
-          <a:p>
-            <a:r>
-              <a:rPr lang="de-DE" dirty="0" err="1"/>
-              <a:t>React</a:t>
-            </a:r>
-            <a:r>
-              <a:rPr lang="de-DE" dirty="0"/>
-              <a:t> DOM vergleicht und ersetzt die Elemente falls nötig</a:t>
-            </a:r>
-          </a:p>
-        </p:txBody>
-      </p:sp>
-      <p:pic>
-        <p:nvPicPr>
-          <p:cNvPr id="7" name="Picture 6">
-            <a:extLst>
-              <a:ext uri="{FF2B5EF4-FFF2-40B4-BE49-F238E27FC236}">
-                <a16:creationId xmlns:a16="http://schemas.microsoft.com/office/drawing/2014/main" id="{E10D074B-F3A5-4FE3-BA8A-BB02FDFC36C8}"/>
-              </a:ext>
-            </a:extLst>
-          </p:cNvPr>
-          <p:cNvPicPr>
-            <a:picLocks noChangeAspect="1"/>
-          </p:cNvPicPr>
-          <p:nvPr/>
-        </p:nvPicPr>
-        <p:blipFill>
-          <a:blip r:embed="rId3"/>
-          <a:stretch>
-            <a:fillRect/>
-          </a:stretch>
-        </p:blipFill>
-        <p:spPr>
-          <a:xfrm>
-            <a:off x="5007141" y="3456609"/>
-            <a:ext cx="6805498" cy="2239341"/>
-          </a:xfrm>
-          <a:prstGeom prst="rect">
-            <a:avLst/>
-          </a:prstGeom>
-          <a:noFill/>
-          <a:ln>
-            <a:noFill/>
-          </a:ln>
-        </p:spPr>
-        <p:style>
-          <a:lnRef idx="0">
-            <a:scrgbClr r="0" g="0" b="0"/>
-          </a:lnRef>
-          <a:fillRef idx="0">
-            <a:scrgbClr r="0" g="0" b="0"/>
-          </a:fillRef>
-          <a:effectRef idx="0">
-            <a:scrgbClr r="0" g="0" b="0"/>
-          </a:effectRef>
-          <a:fontRef idx="minor">
-            <a:schemeClr val="dk1"/>
-          </a:fontRef>
-        </p:style>
-      </p:pic>
-      <p:sp>
-        <p:nvSpPr>
-          <p:cNvPr id="8" name="Rectangle: Rounded Corners 7">
-            <a:extLst>
-              <a:ext uri="{FF2B5EF4-FFF2-40B4-BE49-F238E27FC236}">
-                <a16:creationId xmlns:a16="http://schemas.microsoft.com/office/drawing/2014/main" id="{89EC01FE-A82A-4CCF-B3B6-8F3FA1CBA8E2}"/>
-              </a:ext>
-            </a:extLst>
-          </p:cNvPr>
-          <p:cNvSpPr/>
-          <p:nvPr/>
-        </p:nvSpPr>
-        <p:spPr>
-          <a:xfrm>
-            <a:off x="5425440" y="4781550"/>
-            <a:ext cx="3937635" cy="304800"/>
-          </a:xfrm>
-          <a:prstGeom prst="roundRect">
-            <a:avLst/>
-          </a:prstGeom>
-          <a:noFill/>
-          <a:ln w="38100" cap="flat" cmpd="sng" algn="ctr">
-            <a:solidFill>
-              <a:srgbClr val="C00000"/>
-            </a:solidFill>
-            <a:prstDash val="solid"/>
-            <a:round/>
-            <a:headEnd type="none" w="med" len="med"/>
-            <a:tailEnd type="none" w="med" len="med"/>
-          </a:ln>
-        </p:spPr>
-        <p:style>
-          <a:lnRef idx="0">
-            <a:scrgbClr r="0" g="0" b="0"/>
-          </a:lnRef>
-          <a:fillRef idx="0">
-            <a:scrgbClr r="0" g="0" b="0"/>
-          </a:fillRef>
-          <a:effectRef idx="0">
-            <a:scrgbClr r="0" g="0" b="0"/>
-          </a:effectRef>
-          <a:fontRef idx="minor">
-            <a:schemeClr val="accent6"/>
-          </a:fontRef>
-        </p:style>
-        <p:txBody>
-          <a:bodyPr rtlCol="0" anchor="ctr"/>
-          <a:lstStyle/>
-          <a:p>
-            <a:pPr algn="ctr"/>
-            <a:endParaRPr lang="en-US"/>
-          </a:p>
-        </p:txBody>
-      </p:sp>
-      <p:cxnSp>
-        <p:nvCxnSpPr>
-          <p:cNvPr id="11" name="Straight Arrow Connector 10">
-            <a:extLst>
-              <a:ext uri="{FF2B5EF4-FFF2-40B4-BE49-F238E27FC236}">
-                <a16:creationId xmlns:a16="http://schemas.microsoft.com/office/drawing/2014/main" id="{35099369-A554-467C-A2F2-DC19836B1E9A}"/>
-              </a:ext>
-            </a:extLst>
-          </p:cNvPr>
-          <p:cNvCxnSpPr>
-            <a:cxnSpLocks/>
-          </p:cNvCxnSpPr>
-          <p:nvPr/>
-        </p:nvCxnSpPr>
-        <p:spPr>
-          <a:xfrm flipH="1" flipV="1">
-            <a:off x="5425440" y="5543550"/>
-            <a:ext cx="97536" cy="392673"/>
-          </a:xfrm>
-          <a:prstGeom prst="straightConnector1">
-            <a:avLst/>
-          </a:prstGeom>
-          <a:ln w="38100">
-            <a:solidFill>
-              <a:srgbClr val="C00000"/>
-            </a:solidFill>
-            <a:tailEnd type="triangle"/>
-          </a:ln>
-        </p:spPr>
-        <p:style>
-          <a:lnRef idx="1">
-            <a:schemeClr val="accent1"/>
-          </a:lnRef>
-          <a:fillRef idx="0">
-            <a:schemeClr val="accent1"/>
-          </a:fillRef>
-          <a:effectRef idx="0">
-            <a:schemeClr val="accent1"/>
-          </a:effectRef>
-          <a:fontRef idx="minor">
-            <a:schemeClr val="tx1"/>
-          </a:fontRef>
-        </p:style>
-      </p:cxnSp>
-      <p:sp>
-        <p:nvSpPr>
-          <p:cNvPr id="16" name="TextBox 15">
-            <a:extLst>
-              <a:ext uri="{FF2B5EF4-FFF2-40B4-BE49-F238E27FC236}">
-                <a16:creationId xmlns:a16="http://schemas.microsoft.com/office/drawing/2014/main" id="{E8F7B42B-9C65-49E8-A059-C73ADF0B0CB6}"/>
-              </a:ext>
-            </a:extLst>
-          </p:cNvPr>
-          <p:cNvSpPr txBox="1"/>
-          <p:nvPr/>
-        </p:nvSpPr>
-        <p:spPr>
-          <a:xfrm>
-            <a:off x="5286375" y="5968484"/>
-            <a:ext cx="3886200" cy="369332"/>
-          </a:xfrm>
-          <a:prstGeom prst="rect">
-            <a:avLst/>
-          </a:prstGeom>
-          <a:noFill/>
-        </p:spPr>
-        <p:txBody>
-          <a:bodyPr wrap="square" rtlCol="0">
-            <a:spAutoFit/>
-          </a:bodyPr>
-          <a:lstStyle/>
-          <a:p>
-            <a:r>
-              <a:rPr lang="de-DE" dirty="0"/>
-              <a:t>Ruft Funktion tick() jede 1000ms auf</a:t>
-            </a:r>
-            <a:endParaRPr lang="en-US" dirty="0"/>
-          </a:p>
-        </p:txBody>
-      </p:sp>
     </p:spTree>
     <p:extLst>
       <p:ext uri="{BB962C8B-B14F-4D97-AF65-F5344CB8AC3E}">
-        <p14:creationId xmlns:p14="http://schemas.microsoft.com/office/powerpoint/2010/main" val="2574339107"/>
+        <p14:creationId xmlns:p14="http://schemas.microsoft.com/office/powerpoint/2010/main" val="4275207972"/>
       </p:ext>
     </p:extLst>
   </p:cSld>
@@ -6741,10 +7063,10 @@
       </p:grpSpPr>
       <p:sp>
         <p:nvSpPr>
-          <p:cNvPr id="2" name="Title 1">
+          <p:cNvPr id="10" name="Title 1">
             <a:extLst>
               <a:ext uri="{FF2B5EF4-FFF2-40B4-BE49-F238E27FC236}">
-                <a16:creationId xmlns:a16="http://schemas.microsoft.com/office/drawing/2014/main" id="{D4FCB78D-0182-470A-8354-670A42CE9358}"/>
+                <a16:creationId xmlns:a16="http://schemas.microsoft.com/office/drawing/2014/main" id="{3A01486D-0BBA-40F6-804A-EAD9D61B51BB}"/>
               </a:ext>
             </a:extLst>
           </p:cNvPr>
@@ -6755,14 +7077,23 @@
             <p:ph type="title"/>
           </p:nvPr>
         </p:nvSpPr>
-        <p:spPr/>
+        <p:spPr>
+          <a:xfrm>
+            <a:off x="581193" y="729658"/>
+            <a:ext cx="11029616" cy="988332"/>
+          </a:xfrm>
+        </p:spPr>
         <p:txBody>
           <a:bodyPr/>
           <a:lstStyle/>
           <a:p>
             <a:r>
+              <a:rPr lang="de-DE" dirty="0"/>
+              <a:t>RENDERING </a:t>
+            </a:r>
+            <a:r>
               <a:rPr lang="de-DE" dirty="0" err="1"/>
-              <a:t>Komponent</a:t>
+              <a:t>KONzEPT</a:t>
             </a:r>
             <a:endParaRPr lang="en-US" dirty="0"/>
           </a:p>
@@ -6770,19 +7101,17 @@
       </p:sp>
       <p:pic>
         <p:nvPicPr>
-          <p:cNvPr id="8" name="Content Placeholder 7">
+          <p:cNvPr id="5" name="Picture 4" descr="Graphical user interface, text&#10;&#10;Description automatically generated">
             <a:extLst>
               <a:ext uri="{FF2B5EF4-FFF2-40B4-BE49-F238E27FC236}">
-                <a16:creationId xmlns:a16="http://schemas.microsoft.com/office/drawing/2014/main" id="{D50C715A-1A99-4B05-A7F6-F50626D5D1A0}"/>
+                <a16:creationId xmlns:a16="http://schemas.microsoft.com/office/drawing/2014/main" id="{4D2B1214-24D9-4D9F-BFC3-F5C54A7A94DD}"/>
               </a:ext>
             </a:extLst>
           </p:cNvPr>
           <p:cNvPicPr>
-            <a:picLocks noGrp="1" noChangeAspect="1"/>
+            <a:picLocks noChangeAspect="1"/>
           </p:cNvPicPr>
-          <p:nvPr>
-            <p:ph sz="half" idx="1"/>
-          </p:nvPr>
+          <p:nvPr/>
         </p:nvPicPr>
         <p:blipFill>
           <a:blip r:embed="rId2"/>
@@ -6792,142 +7121,62 @@
         </p:blipFill>
         <p:spPr>
           <a:xfrm>
-            <a:off x="1329988" y="2766919"/>
-            <a:ext cx="3238952" cy="943107"/>
-          </a:xfrm>
-        </p:spPr>
-      </p:pic>
-      <p:sp>
-        <p:nvSpPr>
-          <p:cNvPr id="4" name="Content Placeholder 3">
-            <a:extLst>
-              <a:ext uri="{FF2B5EF4-FFF2-40B4-BE49-F238E27FC236}">
-                <a16:creationId xmlns:a16="http://schemas.microsoft.com/office/drawing/2014/main" id="{047A82DC-3E2A-4CC5-B02A-4F0CCD624DCE}"/>
-              </a:ext>
-            </a:extLst>
-          </p:cNvPr>
-          <p:cNvSpPr>
-            <a:spLocks noGrp="1"/>
-          </p:cNvSpPr>
-          <p:nvPr>
-            <p:ph sz="half" idx="2"/>
-          </p:nvPr>
-        </p:nvSpPr>
-        <p:spPr>
-          <a:xfrm>
-            <a:off x="6773549" y="4209204"/>
-            <a:ext cx="4573595" cy="1651846"/>
-          </a:xfrm>
-        </p:spPr>
-        <p:txBody>
-          <a:bodyPr/>
-          <a:lstStyle/>
-          <a:p>
-            <a:r>
-              <a:rPr lang="de-DE" dirty="0"/>
-              <a:t>Ältere Methode</a:t>
-            </a:r>
-          </a:p>
-          <a:p>
-            <a:r>
-              <a:rPr lang="de-DE" dirty="0"/>
-              <a:t>Benötigt Rendering Funktion</a:t>
-            </a:r>
-          </a:p>
-          <a:p>
-            <a:r>
-              <a:rPr lang="de-DE" dirty="0"/>
-              <a:t>Aufwendiger</a:t>
-            </a:r>
-          </a:p>
-          <a:p>
-            <a:r>
-              <a:rPr lang="de-DE" dirty="0"/>
-              <a:t>Schwere zu lesen</a:t>
-            </a:r>
-          </a:p>
-        </p:txBody>
-      </p:sp>
-      <p:sp>
-        <p:nvSpPr>
-          <p:cNvPr id="5" name="TextBox 4">
-            <a:extLst>
-              <a:ext uri="{FF2B5EF4-FFF2-40B4-BE49-F238E27FC236}">
-                <a16:creationId xmlns:a16="http://schemas.microsoft.com/office/drawing/2014/main" id="{DAC272C6-74BE-4448-9364-17979F34CDE0}"/>
-              </a:ext>
-            </a:extLst>
-          </p:cNvPr>
-          <p:cNvSpPr txBox="1"/>
-          <p:nvPr/>
-        </p:nvSpPr>
-        <p:spPr>
-          <a:xfrm>
-            <a:off x="1512180" y="2100834"/>
-            <a:ext cx="3238952" cy="369332"/>
+            <a:off x="1836565" y="2228003"/>
+            <a:ext cx="2278621" cy="3633047"/>
           </a:xfrm>
           <a:prstGeom prst="rect">
             <a:avLst/>
           </a:prstGeom>
           <a:noFill/>
         </p:spPr>
-        <p:txBody>
-          <a:bodyPr wrap="square" rtlCol="0">
-            <a:spAutoFit/>
-          </a:bodyPr>
-          <a:lstStyle/>
-          <a:p>
-            <a:pPr algn="ctr"/>
-            <a:r>
-              <a:rPr lang="de-DE" dirty="0"/>
-              <a:t>FUNKTION KOMPONENTEN</a:t>
-            </a:r>
-            <a:endParaRPr lang="en-US" dirty="0"/>
-          </a:p>
-        </p:txBody>
-      </p:sp>
-      <p:sp>
-        <p:nvSpPr>
-          <p:cNvPr id="6" name="TextBox 5">
+      </p:pic>
+      <p:sp>
+        <p:nvSpPr>
+          <p:cNvPr id="3" name="Content Placeholder 2">
             <a:extLst>
               <a:ext uri="{FF2B5EF4-FFF2-40B4-BE49-F238E27FC236}">
-                <a16:creationId xmlns:a16="http://schemas.microsoft.com/office/drawing/2014/main" id="{98EEC720-0C42-4E95-B37F-1E36BE11E0EB}"/>
+                <a16:creationId xmlns:a16="http://schemas.microsoft.com/office/drawing/2014/main" id="{14D9B0ED-4C0F-490A-A71E-77D37C733849}"/>
               </a:ext>
             </a:extLst>
           </p:cNvPr>
-          <p:cNvSpPr txBox="1"/>
-          <p:nvPr/>
-        </p:nvSpPr>
-        <p:spPr>
-          <a:xfrm>
-            <a:off x="7440869" y="2100834"/>
-            <a:ext cx="2917483" cy="369332"/>
-          </a:xfrm>
-          <a:prstGeom prst="rect">
-            <a:avLst/>
-          </a:prstGeom>
-          <a:noFill/>
-        </p:spPr>
-        <p:txBody>
-          <a:bodyPr wrap="square" rtlCol="0">
-            <a:spAutoFit/>
+          <p:cNvSpPr>
+            <a:spLocks noGrp="1"/>
+          </p:cNvSpPr>
+          <p:nvPr>
+            <p:ph sz="half" idx="2"/>
+          </p:nvPr>
+        </p:nvSpPr>
+        <p:spPr>
+          <a:xfrm>
+            <a:off x="5522976" y="2228003"/>
+            <a:ext cx="6087833" cy="988333"/>
+          </a:xfrm>
+        </p:spPr>
+        <p:txBody>
+          <a:bodyPr anchor="ctr">
+            <a:normAutofit lnSpcReduction="10000"/>
           </a:bodyPr>
           <a:lstStyle/>
           <a:p>
-            <a:pPr algn="ctr"/>
             <a:r>
               <a:rPr lang="de-DE" dirty="0"/>
-              <a:t>KLASSEN KOMPONENTE</a:t>
-            </a:r>
-            <a:endParaRPr lang="en-US" dirty="0"/>
+              <a:t>React Virtual DOM vergleicht und ersetzt die Elemente falls nötig im aktuellen DOM</a:t>
+            </a:r>
+          </a:p>
+          <a:p>
+            <a:r>
+              <a:rPr lang="de-DE" dirty="0"/>
+              <a:t>Konditionales Rendering möglich</a:t>
+            </a:r>
           </a:p>
         </p:txBody>
       </p:sp>
       <p:pic>
         <p:nvPicPr>
-          <p:cNvPr id="10" name="Picture 9">
+          <p:cNvPr id="7" name="Picture 6">
             <a:extLst>
               <a:ext uri="{FF2B5EF4-FFF2-40B4-BE49-F238E27FC236}">
-                <a16:creationId xmlns:a16="http://schemas.microsoft.com/office/drawing/2014/main" id="{ADB08DC5-EAE0-4ACB-84DE-892DDE866DA7}"/>
+                <a16:creationId xmlns:a16="http://schemas.microsoft.com/office/drawing/2014/main" id="{E10D074B-F3A5-4FE3-BA8A-BB02FDFC36C8}"/>
               </a:ext>
             </a:extLst>
           </p:cNvPr>
@@ -6944,274 +7193,170 @@
         </p:blipFill>
         <p:spPr>
           <a:xfrm>
-            <a:off x="7037214" y="2806543"/>
-            <a:ext cx="3724795" cy="1324160"/>
+            <a:off x="5007141" y="3456609"/>
+            <a:ext cx="6805498" cy="2239341"/>
           </a:xfrm>
           <a:prstGeom prst="rect">
             <a:avLst/>
           </a:prstGeom>
-        </p:spPr>
+          <a:noFill/>
+          <a:ln>
+            <a:noFill/>
+          </a:ln>
+        </p:spPr>
+        <p:style>
+          <a:lnRef idx="0">
+            <a:scrgbClr r="0" g="0" b="0"/>
+          </a:lnRef>
+          <a:fillRef idx="0">
+            <a:scrgbClr r="0" g="0" b="0"/>
+          </a:fillRef>
+          <a:effectRef idx="0">
+            <a:scrgbClr r="0" g="0" b="0"/>
+          </a:effectRef>
+          <a:fontRef idx="minor">
+            <a:schemeClr val="dk1"/>
+          </a:fontRef>
+        </p:style>
       </p:pic>
       <p:sp>
         <p:nvSpPr>
-          <p:cNvPr id="12" name="Content Placeholder 3">
+          <p:cNvPr id="8" name="Rectangle: Rounded Corners 7">
             <a:extLst>
               <a:ext uri="{FF2B5EF4-FFF2-40B4-BE49-F238E27FC236}">
-                <a16:creationId xmlns:a16="http://schemas.microsoft.com/office/drawing/2014/main" id="{166DD1B3-A1A0-43E0-927D-9052D87535F5}"/>
+                <a16:creationId xmlns:a16="http://schemas.microsoft.com/office/drawing/2014/main" id="{89EC01FE-A82A-4CCF-B3B6-8F3FA1CBA8E2}"/>
               </a:ext>
             </a:extLst>
           </p:cNvPr>
-          <p:cNvSpPr txBox="1">
-            <a:spLocks/>
-          </p:cNvSpPr>
+          <p:cNvSpPr/>
           <p:nvPr/>
         </p:nvSpPr>
         <p:spPr>
           <a:xfrm>
-            <a:off x="844856" y="4209204"/>
-            <a:ext cx="4573595" cy="1651846"/>
+            <a:off x="5425440" y="4781550"/>
+            <a:ext cx="3937635" cy="304800"/>
+          </a:xfrm>
+          <a:prstGeom prst="roundRect">
+            <a:avLst/>
+          </a:prstGeom>
+          <a:noFill/>
+          <a:ln w="38100" cap="flat" cmpd="sng" algn="ctr">
+            <a:solidFill>
+              <a:srgbClr val="C00000"/>
+            </a:solidFill>
+            <a:prstDash val="solid"/>
+            <a:round/>
+            <a:headEnd type="none" w="med" len="med"/>
+            <a:tailEnd type="none" w="med" len="med"/>
+          </a:ln>
+        </p:spPr>
+        <p:style>
+          <a:lnRef idx="0">
+            <a:scrgbClr r="0" g="0" b="0"/>
+          </a:lnRef>
+          <a:fillRef idx="0">
+            <a:scrgbClr r="0" g="0" b="0"/>
+          </a:fillRef>
+          <a:effectRef idx="0">
+            <a:scrgbClr r="0" g="0" b="0"/>
+          </a:effectRef>
+          <a:fontRef idx="minor">
+            <a:schemeClr val="accent6"/>
+          </a:fontRef>
+        </p:style>
+        <p:txBody>
+          <a:bodyPr rtlCol="0" anchor="ctr"/>
+          <a:lstStyle/>
+          <a:p>
+            <a:pPr algn="ctr"/>
+            <a:endParaRPr lang="en-US"/>
+          </a:p>
+        </p:txBody>
+      </p:sp>
+      <p:cxnSp>
+        <p:nvCxnSpPr>
+          <p:cNvPr id="11" name="Straight Arrow Connector 10">
+            <a:extLst>
+              <a:ext uri="{FF2B5EF4-FFF2-40B4-BE49-F238E27FC236}">
+                <a16:creationId xmlns:a16="http://schemas.microsoft.com/office/drawing/2014/main" id="{35099369-A554-467C-A2F2-DC19836B1E9A}"/>
+              </a:ext>
+            </a:extLst>
+          </p:cNvPr>
+          <p:cNvCxnSpPr>
+            <a:cxnSpLocks/>
+          </p:cNvCxnSpPr>
+          <p:nvPr/>
+        </p:nvCxnSpPr>
+        <p:spPr>
+          <a:xfrm flipH="1" flipV="1">
+            <a:off x="5425440" y="5543550"/>
+            <a:ext cx="97536" cy="392673"/>
+          </a:xfrm>
+          <a:prstGeom prst="straightConnector1">
+            <a:avLst/>
+          </a:prstGeom>
+          <a:ln w="38100">
+            <a:solidFill>
+              <a:srgbClr val="C00000"/>
+            </a:solidFill>
+            <a:tailEnd type="triangle"/>
+          </a:ln>
+        </p:spPr>
+        <p:style>
+          <a:lnRef idx="1">
+            <a:schemeClr val="accent1"/>
+          </a:lnRef>
+          <a:fillRef idx="0">
+            <a:schemeClr val="accent1"/>
+          </a:fillRef>
+          <a:effectRef idx="0">
+            <a:schemeClr val="accent1"/>
+          </a:effectRef>
+          <a:fontRef idx="minor">
+            <a:schemeClr val="tx1"/>
+          </a:fontRef>
+        </p:style>
+      </p:cxnSp>
+      <p:sp>
+        <p:nvSpPr>
+          <p:cNvPr id="16" name="TextBox 15">
+            <a:extLst>
+              <a:ext uri="{FF2B5EF4-FFF2-40B4-BE49-F238E27FC236}">
+                <a16:creationId xmlns:a16="http://schemas.microsoft.com/office/drawing/2014/main" id="{E8F7B42B-9C65-49E8-A059-C73ADF0B0CB6}"/>
+              </a:ext>
+            </a:extLst>
+          </p:cNvPr>
+          <p:cNvSpPr txBox="1"/>
+          <p:nvPr/>
+        </p:nvSpPr>
+        <p:spPr>
+          <a:xfrm>
+            <a:off x="5286375" y="5968484"/>
+            <a:ext cx="3886200" cy="369332"/>
           </a:xfrm>
           <a:prstGeom prst="rect">
             <a:avLst/>
           </a:prstGeom>
-        </p:spPr>
-        <p:txBody>
-          <a:bodyPr vert="horz" lIns="91440" tIns="45720" rIns="91440" bIns="45720" rtlCol="0" anchor="ctr">
-            <a:normAutofit/>
+          <a:noFill/>
+        </p:spPr>
+        <p:txBody>
+          <a:bodyPr wrap="square" rtlCol="0">
+            <a:spAutoFit/>
           </a:bodyPr>
-          <a:lstStyle>
-            <a:lvl1pPr marL="306000" indent="-306000" algn="l" defTabSz="457200" rtl="0" eaLnBrk="1" latinLnBrk="0" hangingPunct="1">
-              <a:spcBef>
-                <a:spcPct val="20000"/>
-              </a:spcBef>
-              <a:spcAft>
-                <a:spcPts val="600"/>
-              </a:spcAft>
-              <a:buClr>
-                <a:schemeClr val="accent2"/>
-              </a:buClr>
-              <a:buSzPct val="92000"/>
-              <a:buFont typeface="Wingdings 2" panose="05020102010507070707" pitchFamily="18" charset="2"/>
-              <a:buChar char=""/>
-              <a:defRPr sz="1800" kern="1200">
-                <a:solidFill>
-                  <a:schemeClr val="tx2"/>
-                </a:solidFill>
-                <a:latin typeface="+mn-lt"/>
-                <a:ea typeface="+mn-ea"/>
-                <a:cs typeface="+mn-cs"/>
-              </a:defRPr>
-            </a:lvl1pPr>
-            <a:lvl2pPr marL="630000" indent="-306000" algn="l" defTabSz="457200" rtl="0" eaLnBrk="1" latinLnBrk="0" hangingPunct="1">
-              <a:spcBef>
-                <a:spcPct val="20000"/>
-              </a:spcBef>
-              <a:spcAft>
-                <a:spcPts val="600"/>
-              </a:spcAft>
-              <a:buClr>
-                <a:schemeClr val="accent2"/>
-              </a:buClr>
-              <a:buSzPct val="92000"/>
-              <a:buFont typeface="Wingdings 2" panose="05020102010507070707" pitchFamily="18" charset="2"/>
-              <a:buChar char=""/>
-              <a:defRPr sz="1600" kern="1200">
-                <a:solidFill>
-                  <a:schemeClr val="tx2"/>
-                </a:solidFill>
-                <a:latin typeface="+mn-lt"/>
-                <a:ea typeface="+mn-ea"/>
-                <a:cs typeface="+mn-cs"/>
-              </a:defRPr>
-            </a:lvl2pPr>
-            <a:lvl3pPr marL="900000" indent="-270000" algn="l" defTabSz="457200" rtl="0" eaLnBrk="1" latinLnBrk="0" hangingPunct="1">
-              <a:spcBef>
-                <a:spcPct val="20000"/>
-              </a:spcBef>
-              <a:spcAft>
-                <a:spcPts val="600"/>
-              </a:spcAft>
-              <a:buClr>
-                <a:schemeClr val="accent2"/>
-              </a:buClr>
-              <a:buSzPct val="92000"/>
-              <a:buFont typeface="Wingdings 2" panose="05020102010507070707" pitchFamily="18" charset="2"/>
-              <a:buChar char=""/>
-              <a:defRPr sz="1400" kern="1200">
-                <a:solidFill>
-                  <a:schemeClr val="tx2"/>
-                </a:solidFill>
-                <a:latin typeface="+mn-lt"/>
-                <a:ea typeface="+mn-ea"/>
-                <a:cs typeface="+mn-cs"/>
-              </a:defRPr>
-            </a:lvl3pPr>
-            <a:lvl4pPr marL="1242000" indent="-234000" algn="l" defTabSz="457200" rtl="0" eaLnBrk="1" latinLnBrk="0" hangingPunct="1">
-              <a:spcBef>
-                <a:spcPct val="20000"/>
-              </a:spcBef>
-              <a:spcAft>
-                <a:spcPts val="600"/>
-              </a:spcAft>
-              <a:buClr>
-                <a:schemeClr val="accent2"/>
-              </a:buClr>
-              <a:buSzPct val="92000"/>
-              <a:buFont typeface="Wingdings 2" panose="05020102010507070707" pitchFamily="18" charset="2"/>
-              <a:buChar char=""/>
-              <a:defRPr sz="1200" kern="1200">
-                <a:solidFill>
-                  <a:schemeClr val="tx2"/>
-                </a:solidFill>
-                <a:latin typeface="+mn-lt"/>
-                <a:ea typeface="+mn-ea"/>
-                <a:cs typeface="+mn-cs"/>
-              </a:defRPr>
-            </a:lvl4pPr>
-            <a:lvl5pPr marL="1602000" indent="-234000" algn="l" defTabSz="457200" rtl="0" eaLnBrk="1" latinLnBrk="0" hangingPunct="1">
-              <a:spcBef>
-                <a:spcPct val="20000"/>
-              </a:spcBef>
-              <a:spcAft>
-                <a:spcPts val="600"/>
-              </a:spcAft>
-              <a:buClr>
-                <a:schemeClr val="accent2"/>
-              </a:buClr>
-              <a:buSzPct val="92000"/>
-              <a:buFont typeface="Wingdings 2" panose="05020102010507070707" pitchFamily="18" charset="2"/>
-              <a:buChar char=""/>
-              <a:defRPr sz="1200" kern="1200">
-                <a:solidFill>
-                  <a:schemeClr val="tx2"/>
-                </a:solidFill>
-                <a:latin typeface="+mn-lt"/>
-                <a:ea typeface="+mn-ea"/>
-                <a:cs typeface="+mn-cs"/>
-              </a:defRPr>
-            </a:lvl5pPr>
-            <a:lvl6pPr marL="1900000" indent="-228600" algn="l" defTabSz="457200" rtl="0" eaLnBrk="1" latinLnBrk="0" hangingPunct="1">
-              <a:spcBef>
-                <a:spcPct val="20000"/>
-              </a:spcBef>
-              <a:spcAft>
-                <a:spcPts val="600"/>
-              </a:spcAft>
-              <a:buClr>
-                <a:schemeClr val="accent2"/>
-              </a:buClr>
-              <a:buSzPct val="92000"/>
-              <a:buFont typeface="Wingdings 2" panose="05020102010507070707" pitchFamily="18" charset="2"/>
-              <a:buChar char=""/>
-              <a:defRPr sz="1200" kern="1200">
-                <a:solidFill>
-                  <a:schemeClr val="tx2"/>
-                </a:solidFill>
-                <a:latin typeface="+mn-lt"/>
-                <a:ea typeface="+mn-ea"/>
-                <a:cs typeface="+mn-cs"/>
-              </a:defRPr>
-            </a:lvl6pPr>
-            <a:lvl7pPr marL="2200000" indent="-228600" algn="l" defTabSz="457200" rtl="0" eaLnBrk="1" latinLnBrk="0" hangingPunct="1">
-              <a:spcBef>
-                <a:spcPct val="20000"/>
-              </a:spcBef>
-              <a:spcAft>
-                <a:spcPts val="600"/>
-              </a:spcAft>
-              <a:buClr>
-                <a:schemeClr val="accent2"/>
-              </a:buClr>
-              <a:buSzPct val="92000"/>
-              <a:buFont typeface="Wingdings 2" panose="05020102010507070707" pitchFamily="18" charset="2"/>
-              <a:buChar char=""/>
-              <a:defRPr sz="1200" kern="1200">
-                <a:solidFill>
-                  <a:schemeClr val="tx2"/>
-                </a:solidFill>
-                <a:latin typeface="+mn-lt"/>
-                <a:ea typeface="+mn-ea"/>
-                <a:cs typeface="+mn-cs"/>
-              </a:defRPr>
-            </a:lvl7pPr>
-            <a:lvl8pPr marL="2500000" indent="-228600" algn="l" defTabSz="457200" rtl="0" eaLnBrk="1" latinLnBrk="0" hangingPunct="1">
-              <a:spcBef>
-                <a:spcPct val="20000"/>
-              </a:spcBef>
-              <a:spcAft>
-                <a:spcPts val="600"/>
-              </a:spcAft>
-              <a:buClr>
-                <a:schemeClr val="accent2"/>
-              </a:buClr>
-              <a:buSzPct val="92000"/>
-              <a:buFont typeface="Wingdings 2" panose="05020102010507070707" pitchFamily="18" charset="2"/>
-              <a:buChar char=""/>
-              <a:defRPr sz="1200" kern="1200">
-                <a:solidFill>
-                  <a:schemeClr val="tx2"/>
-                </a:solidFill>
-                <a:latin typeface="+mn-lt"/>
-                <a:ea typeface="+mn-ea"/>
-                <a:cs typeface="+mn-cs"/>
-              </a:defRPr>
-            </a:lvl8pPr>
-            <a:lvl9pPr marL="2800000" indent="-228600" algn="l" defTabSz="457200" rtl="0" eaLnBrk="1" latinLnBrk="0" hangingPunct="1">
-              <a:spcBef>
-                <a:spcPct val="20000"/>
-              </a:spcBef>
-              <a:spcAft>
-                <a:spcPts val="600"/>
-              </a:spcAft>
-              <a:buClr>
-                <a:schemeClr val="accent2"/>
-              </a:buClr>
-              <a:buSzPct val="92000"/>
-              <a:buFont typeface="Wingdings 2" panose="05020102010507070707" pitchFamily="18" charset="2"/>
-              <a:buChar char=""/>
-              <a:defRPr sz="1200" kern="1200">
-                <a:solidFill>
-                  <a:schemeClr val="tx2"/>
-                </a:solidFill>
-                <a:latin typeface="+mn-lt"/>
-                <a:ea typeface="+mn-ea"/>
-                <a:cs typeface="+mn-cs"/>
-              </a:defRPr>
-            </a:lvl9pPr>
-          </a:lstStyle>
+          <a:lstStyle/>
           <a:p>
             <a:r>
               <a:rPr lang="de-DE" dirty="0"/>
-              <a:t>Moderner Methode</a:t>
-            </a:r>
-          </a:p>
-          <a:p>
-            <a:r>
-              <a:rPr lang="de-DE" dirty="0" err="1"/>
-              <a:t>Returnd</a:t>
-            </a:r>
-            <a:r>
-              <a:rPr lang="de-DE" dirty="0"/>
-              <a:t> den </a:t>
-            </a:r>
-            <a:r>
-              <a:rPr lang="de-DE" dirty="0" err="1"/>
-              <a:t>Komponent</a:t>
-            </a:r>
-            <a:endParaRPr lang="de-DE" dirty="0"/>
-          </a:p>
-          <a:p>
-            <a:r>
-              <a:rPr lang="de-DE" dirty="0"/>
-              <a:t>Einfacher </a:t>
-            </a:r>
+              <a:t>Ruft Funktion tick() jede 1000ms auf</a:t>
+            </a:r>
+            <a:endParaRPr lang="en-US" dirty="0"/>
           </a:p>
         </p:txBody>
       </p:sp>
     </p:spTree>
     <p:extLst>
       <p:ext uri="{BB962C8B-B14F-4D97-AF65-F5344CB8AC3E}">
-        <p14:creationId xmlns:p14="http://schemas.microsoft.com/office/powerpoint/2010/main" val="167922689"/>
+        <p14:creationId xmlns:p14="http://schemas.microsoft.com/office/powerpoint/2010/main" val="2574339107"/>
       </p:ext>
     </p:extLst>
   </p:cSld>
@@ -7267,6 +7412,305 @@
           <a:lstStyle/>
           <a:p>
             <a:r>
+              <a:rPr lang="de-DE" dirty="0"/>
+              <a:t>Komponente</a:t>
+            </a:r>
+            <a:endParaRPr lang="en-US" dirty="0"/>
+          </a:p>
+        </p:txBody>
+      </p:sp>
+      <p:sp>
+        <p:nvSpPr>
+          <p:cNvPr id="14" name="Text Placeholder 2">
+            <a:extLst>
+              <a:ext uri="{FF2B5EF4-FFF2-40B4-BE49-F238E27FC236}">
+                <a16:creationId xmlns:a16="http://schemas.microsoft.com/office/drawing/2014/main" id="{B5CDDD27-EB1F-4C9D-A394-A0DF9FEE0B54}"/>
+              </a:ext>
+            </a:extLst>
+          </p:cNvPr>
+          <p:cNvSpPr>
+            <a:spLocks noGrp="1"/>
+          </p:cNvSpPr>
+          <p:nvPr>
+            <p:ph type="body" idx="1"/>
+          </p:nvPr>
+        </p:nvSpPr>
+        <p:spPr>
+          <a:xfrm>
+            <a:off x="887219" y="2250892"/>
+            <a:ext cx="5087075" cy="536005"/>
+          </a:xfrm>
+        </p:spPr>
+        <p:txBody>
+          <a:bodyPr/>
+          <a:lstStyle/>
+          <a:p>
+            <a:r>
+              <a:rPr lang="de-DE" dirty="0"/>
+              <a:t>Funktion Komponenten</a:t>
+            </a:r>
+            <a:endParaRPr lang="en-US" dirty="0"/>
+          </a:p>
+        </p:txBody>
+      </p:sp>
+      <p:sp>
+        <p:nvSpPr>
+          <p:cNvPr id="16" name="Content Placeholder 3">
+            <a:extLst>
+              <a:ext uri="{FF2B5EF4-FFF2-40B4-BE49-F238E27FC236}">
+                <a16:creationId xmlns:a16="http://schemas.microsoft.com/office/drawing/2014/main" id="{FD965B84-C2E4-40B4-B513-DA00E208FF07}"/>
+              </a:ext>
+            </a:extLst>
+          </p:cNvPr>
+          <p:cNvSpPr>
+            <a:spLocks noGrp="1"/>
+          </p:cNvSpPr>
+          <p:nvPr>
+            <p:ph sz="half" idx="2"/>
+          </p:nvPr>
+        </p:nvSpPr>
+        <p:spPr>
+          <a:xfrm>
+            <a:off x="581194" y="2926052"/>
+            <a:ext cx="5393100" cy="2934999"/>
+          </a:xfrm>
+        </p:spPr>
+        <p:txBody>
+          <a:bodyPr/>
+          <a:lstStyle/>
+          <a:p>
+            <a:r>
+              <a:rPr lang="de-DE" dirty="0"/>
+              <a:t>Moderner Methode</a:t>
+            </a:r>
+          </a:p>
+          <a:p>
+            <a:r>
+              <a:rPr lang="de-DE" dirty="0" err="1"/>
+              <a:t>Returnd</a:t>
+            </a:r>
+            <a:r>
+              <a:rPr lang="de-DE" dirty="0"/>
+              <a:t> den </a:t>
+            </a:r>
+            <a:r>
+              <a:rPr lang="de-DE" dirty="0" err="1"/>
+              <a:t>Komponent</a:t>
+            </a:r>
+            <a:endParaRPr lang="de-DE" dirty="0"/>
+          </a:p>
+          <a:p>
+            <a:r>
+              <a:rPr lang="de-DE" dirty="0"/>
+              <a:t>Einfacher </a:t>
+            </a:r>
+          </a:p>
+        </p:txBody>
+      </p:sp>
+      <p:sp>
+        <p:nvSpPr>
+          <p:cNvPr id="18" name="Text Placeholder 4">
+            <a:extLst>
+              <a:ext uri="{FF2B5EF4-FFF2-40B4-BE49-F238E27FC236}">
+                <a16:creationId xmlns:a16="http://schemas.microsoft.com/office/drawing/2014/main" id="{86FD568D-1E24-4656-9279-D8A1016DDC31}"/>
+              </a:ext>
+            </a:extLst>
+          </p:cNvPr>
+          <p:cNvSpPr>
+            <a:spLocks noGrp="1"/>
+          </p:cNvSpPr>
+          <p:nvPr>
+            <p:ph type="body" sz="quarter" idx="3"/>
+          </p:nvPr>
+        </p:nvSpPr>
+        <p:spPr>
+          <a:xfrm>
+            <a:off x="6523735" y="2250892"/>
+            <a:ext cx="5087073" cy="553373"/>
+          </a:xfrm>
+        </p:spPr>
+        <p:txBody>
+          <a:bodyPr/>
+          <a:lstStyle/>
+          <a:p>
+            <a:r>
+              <a:rPr lang="de-DE" dirty="0"/>
+              <a:t>Klassen Komponenten</a:t>
+            </a:r>
+            <a:endParaRPr lang="en-US" dirty="0"/>
+          </a:p>
+        </p:txBody>
+      </p:sp>
+      <p:sp>
+        <p:nvSpPr>
+          <p:cNvPr id="20" name="Content Placeholder 5">
+            <a:extLst>
+              <a:ext uri="{FF2B5EF4-FFF2-40B4-BE49-F238E27FC236}">
+                <a16:creationId xmlns:a16="http://schemas.microsoft.com/office/drawing/2014/main" id="{B8DD701B-3953-470B-A2BF-A70127DD0628}"/>
+              </a:ext>
+            </a:extLst>
+          </p:cNvPr>
+          <p:cNvSpPr>
+            <a:spLocks noGrp="1"/>
+          </p:cNvSpPr>
+          <p:nvPr>
+            <p:ph sz="quarter" idx="4"/>
+          </p:nvPr>
+        </p:nvSpPr>
+        <p:spPr>
+          <a:xfrm>
+            <a:off x="6217709" y="2926052"/>
+            <a:ext cx="5393100" cy="2934999"/>
+          </a:xfrm>
+        </p:spPr>
+        <p:txBody>
+          <a:bodyPr/>
+          <a:lstStyle/>
+          <a:p>
+            <a:r>
+              <a:rPr lang="de-DE" dirty="0"/>
+              <a:t>Ältere Methode</a:t>
+            </a:r>
+          </a:p>
+          <a:p>
+            <a:r>
+              <a:rPr lang="de-DE" dirty="0"/>
+              <a:t>Benötigt Rendering Funktion</a:t>
+            </a:r>
+          </a:p>
+          <a:p>
+            <a:r>
+              <a:rPr lang="de-DE" dirty="0"/>
+              <a:t>Aufwendiger</a:t>
+            </a:r>
+          </a:p>
+          <a:p>
+            <a:r>
+              <a:rPr lang="de-DE" dirty="0"/>
+              <a:t>Schwere zu lesen</a:t>
+            </a:r>
+          </a:p>
+        </p:txBody>
+      </p:sp>
+      <p:pic>
+        <p:nvPicPr>
+          <p:cNvPr id="7" name="Content Placeholder 7">
+            <a:extLst>
+              <a:ext uri="{FF2B5EF4-FFF2-40B4-BE49-F238E27FC236}">
+                <a16:creationId xmlns:a16="http://schemas.microsoft.com/office/drawing/2014/main" id="{CFDB2643-5277-481C-A23C-D1573D183941}"/>
+              </a:ext>
+            </a:extLst>
+          </p:cNvPr>
+          <p:cNvPicPr>
+            <a:picLocks noChangeAspect="1"/>
+          </p:cNvPicPr>
+          <p:nvPr/>
+        </p:nvPicPr>
+        <p:blipFill>
+          <a:blip r:embed="rId2"/>
+          <a:stretch>
+            <a:fillRect/>
+          </a:stretch>
+        </p:blipFill>
+        <p:spPr>
+          <a:xfrm>
+            <a:off x="1658268" y="4994708"/>
+            <a:ext cx="3238952" cy="943107"/>
+          </a:xfrm>
+          <a:prstGeom prst="rect">
+            <a:avLst/>
+          </a:prstGeom>
+        </p:spPr>
+      </p:pic>
+      <p:pic>
+        <p:nvPicPr>
+          <p:cNvPr id="8" name="Picture 7">
+            <a:extLst>
+              <a:ext uri="{FF2B5EF4-FFF2-40B4-BE49-F238E27FC236}">
+                <a16:creationId xmlns:a16="http://schemas.microsoft.com/office/drawing/2014/main" id="{8512D310-887A-41AF-929E-D7322195F146}"/>
+              </a:ext>
+            </a:extLst>
+          </p:cNvPr>
+          <p:cNvPicPr>
+            <a:picLocks noChangeAspect="1"/>
+          </p:cNvPicPr>
+          <p:nvPr/>
+        </p:nvPicPr>
+        <p:blipFill>
+          <a:blip r:embed="rId3"/>
+          <a:stretch>
+            <a:fillRect/>
+          </a:stretch>
+        </p:blipFill>
+        <p:spPr>
+          <a:xfrm>
+            <a:off x="7204873" y="4804182"/>
+            <a:ext cx="3724795" cy="1324160"/>
+          </a:xfrm>
+          <a:prstGeom prst="rect">
+            <a:avLst/>
+          </a:prstGeom>
+        </p:spPr>
+      </p:pic>
+    </p:spTree>
+    <p:extLst>
+      <p:ext uri="{BB962C8B-B14F-4D97-AF65-F5344CB8AC3E}">
+        <p14:creationId xmlns:p14="http://schemas.microsoft.com/office/powerpoint/2010/main" val="276505560"/>
+      </p:ext>
+    </p:extLst>
+  </p:cSld>
+  <p:clrMapOvr>
+    <a:masterClrMapping/>
+  </p:clrMapOvr>
+</p:sld>
+</file>
+
+<file path=ppt/slides/slide7.xml><?xml version="1.0" encoding="utf-8"?>
+<p:sld xmlns:a="http://schemas.openxmlformats.org/drawingml/2006/main" xmlns:r="http://schemas.openxmlformats.org/officeDocument/2006/relationships" xmlns:p="http://schemas.openxmlformats.org/presentationml/2006/main">
+  <p:cSld>
+    <p:spTree>
+      <p:nvGrpSpPr>
+        <p:cNvPr id="1" name=""/>
+        <p:cNvGrpSpPr/>
+        <p:nvPr/>
+      </p:nvGrpSpPr>
+      <p:grpSpPr>
+        <a:xfrm>
+          <a:off x="0" y="0"/>
+          <a:ext cx="0" cy="0"/>
+          <a:chOff x="0" y="0"/>
+          <a:chExt cx="0" cy="0"/>
+        </a:xfrm>
+      </p:grpSpPr>
+      <p:sp>
+        <p:nvSpPr>
+          <p:cNvPr id="2" name="Title 1">
+            <a:extLst>
+              <a:ext uri="{FF2B5EF4-FFF2-40B4-BE49-F238E27FC236}">
+                <a16:creationId xmlns:a16="http://schemas.microsoft.com/office/drawing/2014/main" id="{14305E51-F776-4EC9-9235-453E04EBA615}"/>
+              </a:ext>
+            </a:extLst>
+          </p:cNvPr>
+          <p:cNvSpPr>
+            <a:spLocks noGrp="1"/>
+          </p:cNvSpPr>
+          <p:nvPr>
+            <p:ph type="title"/>
+          </p:nvPr>
+        </p:nvSpPr>
+        <p:spPr>
+          <a:xfrm>
+            <a:off x="581193" y="729658"/>
+            <a:ext cx="11029616" cy="988332"/>
+          </a:xfrm>
+        </p:spPr>
+        <p:txBody>
+          <a:bodyPr anchor="b">
+            <a:normAutofit/>
+          </a:bodyPr>
+          <a:lstStyle/>
+          <a:p>
+            <a:r>
               <a:rPr lang="de-DE" dirty="0" err="1"/>
               <a:t>lifecycle</a:t>
             </a:r>
@@ -7612,7 +8056,7 @@
 </p:sld>
 </file>
 
-<file path=ppt/slides/slide7.xml><?xml version="1.0" encoding="utf-8"?>
+<file path=ppt/slides/slide8.xml><?xml version="1.0" encoding="utf-8"?>
 <p:sld xmlns:a="http://schemas.openxmlformats.org/drawingml/2006/main" xmlns:r="http://schemas.openxmlformats.org/officeDocument/2006/relationships" xmlns:p="http://schemas.openxmlformats.org/presentationml/2006/main">
   <p:cSld>
     <p:spTree>
@@ -7673,200 +8117,6 @@
 </p:sld>
 </file>
 
-<file path=ppt/slides/slide8.xml><?xml version="1.0" encoding="utf-8"?>
-<p:sld xmlns:a="http://schemas.openxmlformats.org/drawingml/2006/main" xmlns:r="http://schemas.openxmlformats.org/officeDocument/2006/relationships" xmlns:p="http://schemas.openxmlformats.org/presentationml/2006/main">
-  <p:cSld>
-    <p:spTree>
-      <p:nvGrpSpPr>
-        <p:cNvPr id="1" name=""/>
-        <p:cNvGrpSpPr/>
-        <p:nvPr/>
-      </p:nvGrpSpPr>
-      <p:grpSpPr>
-        <a:xfrm>
-          <a:off x="0" y="0"/>
-          <a:ext cx="0" cy="0"/>
-          <a:chOff x="0" y="0"/>
-          <a:chExt cx="0" cy="0"/>
-        </a:xfrm>
-      </p:grpSpPr>
-      <p:sp>
-        <p:nvSpPr>
-          <p:cNvPr id="2" name="Title 1">
-            <a:extLst>
-              <a:ext uri="{FF2B5EF4-FFF2-40B4-BE49-F238E27FC236}">
-                <a16:creationId xmlns:a16="http://schemas.microsoft.com/office/drawing/2014/main" id="{14305E51-F776-4EC9-9235-453E04EBA615}"/>
-              </a:ext>
-            </a:extLst>
-          </p:cNvPr>
-          <p:cNvSpPr>
-            <a:spLocks noGrp="1"/>
-          </p:cNvSpPr>
-          <p:nvPr>
-            <p:ph type="title"/>
-          </p:nvPr>
-        </p:nvSpPr>
-        <p:spPr>
-          <a:xfrm>
-            <a:off x="581192" y="702156"/>
-            <a:ext cx="11029616" cy="1013800"/>
-          </a:xfrm>
-        </p:spPr>
-        <p:txBody>
-          <a:bodyPr anchor="b">
-            <a:normAutofit/>
-          </a:bodyPr>
-          <a:lstStyle/>
-          <a:p>
-            <a:r>
-              <a:rPr lang="de-DE" dirty="0"/>
-              <a:t>State</a:t>
-            </a:r>
-            <a:endParaRPr lang="en-US" dirty="0"/>
-          </a:p>
-        </p:txBody>
-      </p:sp>
-      <p:sp>
-        <p:nvSpPr>
-          <p:cNvPr id="25" name="Content Placeholder 2">
-            <a:extLst>
-              <a:ext uri="{FF2B5EF4-FFF2-40B4-BE49-F238E27FC236}">
-                <a16:creationId xmlns:a16="http://schemas.microsoft.com/office/drawing/2014/main" id="{CDFC625E-72A2-4153-8678-DE3C0FB9D19E}"/>
-              </a:ext>
-            </a:extLst>
-          </p:cNvPr>
-          <p:cNvSpPr>
-            <a:spLocks noGrp="1"/>
-          </p:cNvSpPr>
-          <p:nvPr>
-            <p:ph idx="1"/>
-          </p:nvPr>
-        </p:nvSpPr>
-        <p:spPr>
-          <a:xfrm>
-            <a:off x="581192" y="2180496"/>
-            <a:ext cx="11029615" cy="3678303"/>
-          </a:xfrm>
-        </p:spPr>
-        <p:txBody>
-          <a:bodyPr/>
-          <a:lstStyle/>
-          <a:p>
-            <a:r>
-              <a:rPr lang="de-DE" dirty="0"/>
-              <a:t>Speichern was angezeigt werden soll</a:t>
-            </a:r>
-          </a:p>
-          <a:p>
-            <a:r>
-              <a:rPr lang="de-DE" dirty="0" err="1"/>
-              <a:t>setState</a:t>
-            </a:r>
-            <a:r>
-              <a:rPr lang="de-DE" dirty="0"/>
-              <a:t>({…}); </a:t>
-            </a:r>
-            <a:r>
-              <a:rPr lang="de-DE" dirty="0">
-                <a:solidFill>
-                  <a:schemeClr val="accent4">
-                    <a:lumMod val="50000"/>
-                  </a:schemeClr>
-                </a:solidFill>
-              </a:rPr>
-              <a:t>(</a:t>
-            </a:r>
-            <a:r>
-              <a:rPr lang="de-DE" dirty="0" err="1">
-                <a:solidFill>
-                  <a:schemeClr val="accent4">
-                    <a:lumMod val="50000"/>
-                  </a:schemeClr>
-                </a:solidFill>
-              </a:rPr>
-              <a:t>updated</a:t>
-            </a:r>
-            <a:r>
-              <a:rPr lang="de-DE" dirty="0">
-                <a:solidFill>
-                  <a:schemeClr val="accent4">
-                    <a:lumMod val="50000"/>
-                  </a:schemeClr>
-                </a:solidFill>
-              </a:rPr>
-              <a:t> den </a:t>
-            </a:r>
-            <a:r>
-              <a:rPr lang="de-DE" dirty="0" err="1">
-                <a:solidFill>
-                  <a:schemeClr val="accent4">
-                    <a:lumMod val="50000"/>
-                  </a:schemeClr>
-                </a:solidFill>
-              </a:rPr>
-              <a:t>state</a:t>
-            </a:r>
-            <a:r>
-              <a:rPr lang="de-DE" dirty="0">
-                <a:solidFill>
-                  <a:schemeClr val="accent4">
-                    <a:lumMod val="50000"/>
-                  </a:schemeClr>
-                </a:solidFill>
-              </a:rPr>
-              <a:t>)</a:t>
-            </a:r>
-          </a:p>
-          <a:p>
-            <a:r>
-              <a:rPr lang="de-DE" dirty="0" err="1">
-                <a:solidFill>
-                  <a:schemeClr val="tx1"/>
-                </a:solidFill>
-              </a:rPr>
-              <a:t>useState</a:t>
-            </a:r>
-            <a:r>
-              <a:rPr lang="de-DE" dirty="0">
-                <a:solidFill>
-                  <a:schemeClr val="tx1"/>
-                </a:solidFill>
-              </a:rPr>
-              <a:t>(…); </a:t>
-            </a:r>
-            <a:r>
-              <a:rPr lang="de-DE" dirty="0">
-                <a:solidFill>
-                  <a:schemeClr val="accent4">
-                    <a:lumMod val="50000"/>
-                  </a:schemeClr>
-                </a:solidFill>
-              </a:rPr>
-              <a:t>(erstellt einen State für eine Funktion Komponente)</a:t>
-            </a:r>
-            <a:endParaRPr lang="en-US" dirty="0">
-              <a:solidFill>
-                <a:schemeClr val="accent4">
-                  <a:lumMod val="50000"/>
-                </a:schemeClr>
-              </a:solidFill>
-            </a:endParaRPr>
-          </a:p>
-        </p:txBody>
-      </p:sp>
-    </p:spTree>
-    <p:extLst>
-      <p:ext uri="{BB962C8B-B14F-4D97-AF65-F5344CB8AC3E}">
-        <p14:creationId xmlns:p14="http://schemas.microsoft.com/office/powerpoint/2010/main" val="1483797574"/>
-      </p:ext>
-    </p:extLst>
-  </p:cSld>
-  <p:clrMapOvr>
-    <a:masterClrMapping/>
-  </p:clrMapOvr>
-</p:sld>
-</file>
-
 <file path=ppt/slides/slide9.xml><?xml version="1.0" encoding="utf-8"?>
 <p:sld xmlns:a="http://schemas.openxmlformats.org/drawingml/2006/main" xmlns:r="http://schemas.openxmlformats.org/officeDocument/2006/relationships" xmlns:p="http://schemas.openxmlformats.org/presentationml/2006/main">
   <p:cSld>
@@ -7889,7 +8139,7 @@
           <p:cNvPr id="2" name="Title 1">
             <a:extLst>
               <a:ext uri="{FF2B5EF4-FFF2-40B4-BE49-F238E27FC236}">
-                <a16:creationId xmlns:a16="http://schemas.microsoft.com/office/drawing/2014/main" id="{2ADF3388-421B-4AF7-A9D3-8C01B7C143E2}"/>
+                <a16:creationId xmlns:a16="http://schemas.microsoft.com/office/drawing/2014/main" id="{14305E51-F776-4EC9-9235-453E04EBA615}"/>
               </a:ext>
             </a:extLst>
           </p:cNvPr>
@@ -7900,25 +8150,32 @@
             <p:ph type="title"/>
           </p:nvPr>
         </p:nvSpPr>
-        <p:spPr/>
-        <p:txBody>
-          <a:bodyPr/>
+        <p:spPr>
+          <a:xfrm>
+            <a:off x="581192" y="702156"/>
+            <a:ext cx="11029616" cy="1013800"/>
+          </a:xfrm>
+        </p:spPr>
+        <p:txBody>
+          <a:bodyPr anchor="b">
+            <a:normAutofit/>
+          </a:bodyPr>
           <a:lstStyle/>
           <a:p>
             <a:r>
-              <a:rPr lang="de-DE" dirty="0" err="1"/>
-              <a:t>Sass</a:t>
-            </a:r>
-            <a:endParaRPr lang="en-US" dirty="0"/>
-          </a:p>
-        </p:txBody>
-      </p:sp>
-      <p:sp>
-        <p:nvSpPr>
-          <p:cNvPr id="3" name="Content Placeholder 2">
+              <a:rPr lang="de-DE" dirty="0"/>
+              <a:t>State</a:t>
+            </a:r>
+            <a:endParaRPr lang="en-US" dirty="0"/>
+          </a:p>
+        </p:txBody>
+      </p:sp>
+      <p:sp>
+        <p:nvSpPr>
+          <p:cNvPr id="25" name="Content Placeholder 2">
             <a:extLst>
               <a:ext uri="{FF2B5EF4-FFF2-40B4-BE49-F238E27FC236}">
-                <a16:creationId xmlns:a16="http://schemas.microsoft.com/office/drawing/2014/main" id="{77780C97-DC9B-4412-8B13-AF471E3CDDC5}"/>
+                <a16:creationId xmlns:a16="http://schemas.microsoft.com/office/drawing/2014/main" id="{CDFC625E-72A2-4153-8678-DE3C0FB9D19E}"/>
               </a:ext>
             </a:extLst>
           </p:cNvPr>
@@ -7929,40 +8186,229 @@
             <p:ph idx="1"/>
           </p:nvPr>
         </p:nvSpPr>
-        <p:spPr/>
+        <p:spPr>
+          <a:xfrm>
+            <a:off x="581192" y="2334496"/>
+            <a:ext cx="11029615" cy="2189007"/>
+          </a:xfrm>
+        </p:spPr>
         <p:txBody>
           <a:bodyPr/>
           <a:lstStyle/>
           <a:p>
             <a:r>
               <a:rPr lang="de-DE" dirty="0"/>
-              <a:t>Entwickler: Natalie Weizenbaum, Chris Eppstein</a:t>
-            </a:r>
-          </a:p>
-          <a:p>
+              <a:t>Speichern was angezeigt werden soll</a:t>
+            </a:r>
+          </a:p>
+          <a:p>
+            <a:r>
+              <a:rPr lang="de-DE" dirty="0" err="1"/>
+              <a:t>setState</a:t>
+            </a:r>
             <a:r>
               <a:rPr lang="de-DE" dirty="0"/>
-              <a:t>Erscheinungsjahr: 2012</a:t>
-            </a:r>
-          </a:p>
-          <a:p>
-            <a:r>
-              <a:rPr lang="de-DE" dirty="0"/>
-              <a:t>SASS unterstützt die SCSS-Syntax komplett</a:t>
-            </a:r>
-          </a:p>
-          <a:p>
-            <a:r>
-              <a:rPr lang="de-DE" dirty="0"/>
-              <a:t>Variablen können verwendet werden</a:t>
-            </a:r>
-          </a:p>
-        </p:txBody>
-      </p:sp>
+              <a:t>({…}); </a:t>
+            </a:r>
+            <a:r>
+              <a:rPr lang="de-DE" dirty="0">
+                <a:solidFill>
+                  <a:schemeClr val="accent4">
+                    <a:lumMod val="50000"/>
+                  </a:schemeClr>
+                </a:solidFill>
+              </a:rPr>
+              <a:t>(</a:t>
+            </a:r>
+            <a:r>
+              <a:rPr lang="de-DE" dirty="0" err="1">
+                <a:solidFill>
+                  <a:schemeClr val="accent4">
+                    <a:lumMod val="50000"/>
+                  </a:schemeClr>
+                </a:solidFill>
+              </a:rPr>
+              <a:t>updated</a:t>
+            </a:r>
+            <a:r>
+              <a:rPr lang="de-DE" dirty="0">
+                <a:solidFill>
+                  <a:schemeClr val="accent4">
+                    <a:lumMod val="50000"/>
+                  </a:schemeClr>
+                </a:solidFill>
+              </a:rPr>
+              <a:t> den </a:t>
+            </a:r>
+            <a:r>
+              <a:rPr lang="de-DE" dirty="0" err="1">
+                <a:solidFill>
+                  <a:schemeClr val="accent4">
+                    <a:lumMod val="50000"/>
+                  </a:schemeClr>
+                </a:solidFill>
+              </a:rPr>
+              <a:t>state</a:t>
+            </a:r>
+            <a:r>
+              <a:rPr lang="de-DE" dirty="0">
+                <a:solidFill>
+                  <a:schemeClr val="accent4">
+                    <a:lumMod val="50000"/>
+                  </a:schemeClr>
+                </a:solidFill>
+              </a:rPr>
+              <a:t>)</a:t>
+            </a:r>
+          </a:p>
+          <a:p>
+            <a:r>
+              <a:rPr lang="de-DE" dirty="0" err="1">
+                <a:solidFill>
+                  <a:schemeClr val="tx1"/>
+                </a:solidFill>
+              </a:rPr>
+              <a:t>useState</a:t>
+            </a:r>
+            <a:r>
+              <a:rPr lang="de-DE" dirty="0">
+                <a:solidFill>
+                  <a:schemeClr val="tx1"/>
+                </a:solidFill>
+              </a:rPr>
+              <a:t>(…); </a:t>
+            </a:r>
+            <a:r>
+              <a:rPr lang="de-DE" dirty="0">
+                <a:solidFill>
+                  <a:schemeClr val="accent4">
+                    <a:lumMod val="50000"/>
+                  </a:schemeClr>
+                </a:solidFill>
+              </a:rPr>
+              <a:t>(erstellt einen State für eine Funktion Komponente)</a:t>
+            </a:r>
+            <a:endParaRPr lang="en-US" dirty="0">
+              <a:solidFill>
+                <a:schemeClr val="accent4">
+                  <a:lumMod val="50000"/>
+                </a:schemeClr>
+              </a:solidFill>
+            </a:endParaRPr>
+          </a:p>
+        </p:txBody>
+      </p:sp>
+      <p:pic>
+        <p:nvPicPr>
+          <p:cNvPr id="4" name="Picture 3">
+            <a:extLst>
+              <a:ext uri="{FF2B5EF4-FFF2-40B4-BE49-F238E27FC236}">
+                <a16:creationId xmlns:a16="http://schemas.microsoft.com/office/drawing/2014/main" id="{57CB12E5-49F6-4DC1-AF9B-26849BD1B540}"/>
+              </a:ext>
+            </a:extLst>
+          </p:cNvPr>
+          <p:cNvPicPr>
+            <a:picLocks noChangeAspect="1"/>
+          </p:cNvPicPr>
+          <p:nvPr/>
+        </p:nvPicPr>
+        <p:blipFill>
+          <a:blip r:embed="rId2"/>
+          <a:stretch>
+            <a:fillRect/>
+          </a:stretch>
+        </p:blipFill>
+        <p:spPr>
+          <a:xfrm>
+            <a:off x="581192" y="5075989"/>
+            <a:ext cx="3760561" cy="1082376"/>
+          </a:xfrm>
+          <a:prstGeom prst="rect">
+            <a:avLst/>
+          </a:prstGeom>
+        </p:spPr>
+      </p:pic>
+      <p:pic>
+        <p:nvPicPr>
+          <p:cNvPr id="6" name="Picture 5">
+            <a:extLst>
+              <a:ext uri="{FF2B5EF4-FFF2-40B4-BE49-F238E27FC236}">
+                <a16:creationId xmlns:a16="http://schemas.microsoft.com/office/drawing/2014/main" id="{405FA718-7314-4298-9950-683EC229CD65}"/>
+              </a:ext>
+            </a:extLst>
+          </p:cNvPr>
+          <p:cNvPicPr>
+            <a:picLocks noChangeAspect="1"/>
+          </p:cNvPicPr>
+          <p:nvPr/>
+        </p:nvPicPr>
+        <p:blipFill>
+          <a:blip r:embed="rId3"/>
+          <a:stretch>
+            <a:fillRect/>
+          </a:stretch>
+        </p:blipFill>
+        <p:spPr>
+          <a:xfrm>
+            <a:off x="5744598" y="5075989"/>
+            <a:ext cx="5866209" cy="1082376"/>
+          </a:xfrm>
+          <a:prstGeom prst="rect">
+            <a:avLst/>
+          </a:prstGeom>
+        </p:spPr>
+      </p:pic>
+      <p:pic>
+        <p:nvPicPr>
+          <p:cNvPr id="1026" name="Picture 2">
+            <a:extLst>
+              <a:ext uri="{FF2B5EF4-FFF2-40B4-BE49-F238E27FC236}">
+                <a16:creationId xmlns:a16="http://schemas.microsoft.com/office/drawing/2014/main" id="{19B95D2D-CE74-48AB-AD01-1B8230D8F41B}"/>
+              </a:ext>
+            </a:extLst>
+          </p:cNvPr>
+          <p:cNvPicPr>
+            <a:picLocks noChangeAspect="1" noChangeArrowheads="1"/>
+          </p:cNvPicPr>
+          <p:nvPr/>
+        </p:nvPicPr>
+        <p:blipFill>
+          <a:blip r:embed="rId4">
+            <a:extLst>
+              <a:ext uri="{28A0092B-C50C-407E-A947-70E740481C1C}">
+                <a14:useLocalDpi xmlns:a14="http://schemas.microsoft.com/office/drawing/2010/main" val="0"/>
+              </a:ext>
+            </a:extLst>
+          </a:blip>
+          <a:srcRect/>
+          <a:stretch>
+            <a:fillRect/>
+          </a:stretch>
+        </p:blipFill>
+        <p:spPr bwMode="auto">
+          <a:xfrm>
+            <a:off x="2813385" y="4266436"/>
+            <a:ext cx="6565227" cy="533310"/>
+          </a:xfrm>
+          <a:prstGeom prst="rect">
+            <a:avLst/>
+          </a:prstGeom>
+          <a:noFill/>
+          <a:extLst>
+            <a:ext uri="{909E8E84-426E-40DD-AFC4-6F175D3DCCD1}">
+              <a14:hiddenFill xmlns:a14="http://schemas.microsoft.com/office/drawing/2010/main">
+                <a:solidFill>
+                  <a:srgbClr val="FFFFFF"/>
+                </a:solidFill>
+              </a14:hiddenFill>
+            </a:ext>
+          </a:extLst>
+        </p:spPr>
+      </p:pic>
     </p:spTree>
     <p:extLst>
       <p:ext uri="{BB962C8B-B14F-4D97-AF65-F5344CB8AC3E}">
-        <p14:creationId xmlns:p14="http://schemas.microsoft.com/office/powerpoint/2010/main" val="3646550381"/>
+        <p14:creationId xmlns:p14="http://schemas.microsoft.com/office/powerpoint/2010/main" val="1483797574"/>
       </p:ext>
     </p:extLst>
   </p:cSld>

</xml_diff>